<commit_message>
Presentazione finale - Aggiunta note parte Luca!
</commit_message>
<xml_diff>
--- a/Presentazione/Atsilo2/Atsilo_M_PresentazioneFinale.pptx
+++ b/Presentazione/Atsilo2/Atsilo_M_PresentazioneFinale.pptx
@@ -281,7 +281,7 @@
             <a:fld id="{38D78F4D-402C-46E0-A4BB-DF91EA86B14C}" type="datetimeFigureOut">
               <a:rPr lang="it-IT" smtClean="0"/>
               <a:pPr/>
-              <a:t>04/01/2013</a:t>
+              <a:t>06/01/2013</a:t>
             </a:fld>
             <a:endParaRPr lang="it-IT"/>
           </a:p>
@@ -450,7 +450,7 @@
     </p:spTree>
     <p:extLst>
       <p:ext uri="{BB962C8B-B14F-4D97-AF65-F5344CB8AC3E}">
-        <p14:creationId xmlns:p14="http://schemas.microsoft.com/office/powerpoint/2010/main" xmlns="" val="2126419590"/>
+        <p14:creationId xmlns="" xmlns:p14="http://schemas.microsoft.com/office/powerpoint/2010/main" val="2126419590"/>
       </p:ext>
     </p:extLst>
   </p:cSld>
@@ -625,7 +625,7 @@
     </p:spTree>
     <p:extLst>
       <p:ext uri="{BB962C8B-B14F-4D97-AF65-F5344CB8AC3E}">
-        <p14:creationId xmlns:p14="http://schemas.microsoft.com/office/powerpoint/2010/main" xmlns="" val="3122029082"/>
+        <p14:creationId xmlns="" xmlns:p14="http://schemas.microsoft.com/office/powerpoint/2010/main" val="3122029082"/>
       </p:ext>
     </p:extLst>
   </p:cSld>
@@ -718,7 +718,7 @@
     </p:spTree>
     <p:extLst>
       <p:ext uri="{BB962C8B-B14F-4D97-AF65-F5344CB8AC3E}">
-        <p14:creationId xmlns:p14="http://schemas.microsoft.com/office/powerpoint/2010/main" xmlns="" val="3771085237"/>
+        <p14:creationId xmlns="" xmlns:p14="http://schemas.microsoft.com/office/powerpoint/2010/main" val="3771085237"/>
       </p:ext>
     </p:extLst>
   </p:cSld>
@@ -870,7 +870,7 @@
     </p:spTree>
     <p:extLst>
       <p:ext uri="{BB962C8B-B14F-4D97-AF65-F5344CB8AC3E}">
-        <p14:creationId xmlns:p14="http://schemas.microsoft.com/office/powerpoint/2010/main" xmlns="" val="2716859324"/>
+        <p14:creationId xmlns="" xmlns:p14="http://schemas.microsoft.com/office/powerpoint/2010/main" val="2716859324"/>
       </p:ext>
     </p:extLst>
   </p:cSld>
@@ -963,7 +963,7 @@
     </p:spTree>
     <p:extLst>
       <p:ext uri="{BB962C8B-B14F-4D97-AF65-F5344CB8AC3E}">
-        <p14:creationId xmlns:p14="http://schemas.microsoft.com/office/powerpoint/2010/main" xmlns="" val="3122029082"/>
+        <p14:creationId xmlns="" xmlns:p14="http://schemas.microsoft.com/office/powerpoint/2010/main" val="3122029082"/>
       </p:ext>
     </p:extLst>
   </p:cSld>
@@ -1138,7 +1138,7 @@
     </p:spTree>
     <p:extLst>
       <p:ext uri="{BB962C8B-B14F-4D97-AF65-F5344CB8AC3E}">
-        <p14:creationId xmlns:p14="http://schemas.microsoft.com/office/powerpoint/2010/main" xmlns="" val="2716859324"/>
+        <p14:creationId xmlns="" xmlns:p14="http://schemas.microsoft.com/office/powerpoint/2010/main" val="2716859324"/>
       </p:ext>
     </p:extLst>
   </p:cSld>
@@ -1230,7 +1230,7 @@
     </p:spTree>
     <p:extLst>
       <p:ext uri="{BB962C8B-B14F-4D97-AF65-F5344CB8AC3E}">
-        <p14:creationId xmlns:p14="http://schemas.microsoft.com/office/powerpoint/2010/main" xmlns="" val="1159000954"/>
+        <p14:creationId xmlns="" xmlns:p14="http://schemas.microsoft.com/office/powerpoint/2010/main" val="1159000954"/>
       </p:ext>
     </p:extLst>
   </p:cSld>
@@ -1286,24 +1286,30 @@
           </a:bodyPr>
           <a:lstStyle/>
           <a:p>
-            <a:r>
-              <a:rPr lang="it-IT" sz="1200" dirty="0" smtClean="0"/>
-              <a:t>Il sistema deve garantire la sicurezza e l'affidabilità nell'inserimento dei propri dati sensibili, sia in campo di sicurezza web, sia nel caso del rispetto delle leggi in vigore sulla visibilità e sul trattamento dei dati personali. I dati inseriti nel sistema, durante la registrazione o in altre fasi critiche fanno parte di informazioni strettamente personali.</a:t>
-            </a:r>
-          </a:p>
-          <a:p>
-            <a:r>
-              <a:rPr lang="it-IT" sz="1200" dirty="0" smtClean="0"/>
-              <a:t>Qualora quest’ultime venissero rese pubbliche, il sistema notificherà l’accaduto al proprietario dei dati personali.</a:t>
-            </a:r>
-          </a:p>
-          <a:p>
-            <a:endParaRPr lang="it-IT" sz="1200" dirty="0" smtClean="0"/>
-          </a:p>
-          <a:p>
-            <a:r>
-              <a:rPr lang="it-IT" sz="1200" dirty="0" smtClean="0"/>
-              <a:t>Il sistema permette agli utenti di compilare i questionari in maniera anonima nonostante abbiano effettuato l’accesso e siano stati identificati.</a:t>
+            <a:pPr marL="0" marR="0" indent="0" algn="l" defTabSz="914400" rtl="0" eaLnBrk="1" fontAlgn="auto" latinLnBrk="0" hangingPunct="1">
+              <a:lnSpc>
+                <a:spcPct val="100000"/>
+              </a:lnSpc>
+              <a:spcBef>
+                <a:spcPts val="0"/>
+              </a:spcBef>
+              <a:spcAft>
+                <a:spcPts val="0"/>
+              </a:spcAft>
+              <a:buClrTx/>
+              <a:buSzTx/>
+              <a:buFontTx/>
+              <a:buNone/>
+              <a:tabLst/>
+              <a:defRPr/>
+            </a:pPr>
+            <a:r>
+              <a:rPr lang="it-IT" dirty="0" smtClean="0"/>
+              <a:t>Gli obiettivi di design servono a definire le basi per la produzione e lo sviluppo del nostro</a:t>
+            </a:r>
+            <a:r>
+              <a:rPr lang="it-IT" baseline="0" dirty="0" smtClean="0"/>
+              <a:t> sistema, in quanto su di esse vengono fondate le scelte prese durante la fase d’implementazione. </a:t>
             </a:r>
           </a:p>
           <a:p>
@@ -1329,7 +1335,7 @@
             <a:fld id="{D70604CA-7593-4640-8FA1-5523937B8510}" type="slidenum">
               <a:rPr lang="it-IT" smtClean="0"/>
               <a:pPr/>
-              <a:t>39</a:t>
+              <a:t>38</a:t>
             </a:fld>
             <a:endParaRPr lang="it-IT"/>
           </a:p>
@@ -1389,24 +1395,19 @@
           </a:bodyPr>
           <a:lstStyle/>
           <a:p>
-            <a:pPr algn="just"/>
             <a:r>
               <a:rPr lang="it-IT" sz="1200" dirty="0" smtClean="0"/>
-              <a:t>Gli utenti del sistema compiono giornalmente delle operazioni. Il sistema si occupa quasi esclusivamente di interrogazioni al database, gli utenti, quindi, consultano e modificano gli elenchi, dopo aver eseguito operazioni di login. Questo tipo di operazioni, login e consultazione/modifica, seppur oneroso per il database di grande dimensioni, non può quindi occupare più di qualche secondo per produrre risultati. In altre parole il tempo di attese di un utente è di pochi secondi.</a:t>
-            </a:r>
-          </a:p>
-          <a:p>
-            <a:pPr algn="just"/>
-            <a:r>
-              <a:rPr lang="it-IT" sz="1200" dirty="0" smtClean="0"/>
-              <a:t>Il sistema deve permettere all’utente di poter ricevere un riscontro da parte del sistema in non più di 5 secondi. </a:t>
-            </a:r>
-          </a:p>
-          <a:p>
-            <a:pPr algn="just"/>
-            <a:r>
-              <a:rPr lang="it-IT" sz="1200" dirty="0" smtClean="0"/>
-              <a:t>Inoltre il sistema deve ridurre significativamente il tempo di compilazione dei questionari compilando le domande di cui già conosce le risposte al posto del genitore.</a:t>
+              <a:t>Il</a:t>
+            </a:r>
+            <a:r>
+              <a:rPr lang="it-IT" sz="1200" baseline="0" dirty="0" smtClean="0"/>
+              <a:t> nostro sistema garantisce la sicurezza e la tutela della privacy gestendo i dati sensibili di ogni utente iscritto secondo le leggi in vigore. </a:t>
+            </a:r>
+          </a:p>
+          <a:p>
+            <a:r>
+              <a:rPr lang="it-IT" sz="1200" baseline="0" dirty="0" smtClean="0"/>
+              <a:t>Ad esempio nella gestione dei pagamenti andremo a trattare dati personali come numeri di carte di credito e per questo bisognerà tutelare l’utente finale.</a:t>
             </a:r>
           </a:p>
           <a:p>
@@ -1432,7 +1433,7 @@
             <a:fld id="{D70604CA-7593-4640-8FA1-5523937B8510}" type="slidenum">
               <a:rPr lang="it-IT" smtClean="0"/>
               <a:pPr/>
-              <a:t>40</a:t>
+              <a:t>39</a:t>
             </a:fld>
             <a:endParaRPr lang="it-IT"/>
           </a:p>
@@ -1492,14 +1493,28 @@
           </a:bodyPr>
           <a:lstStyle/>
           <a:p>
-            <a:r>
-              <a:rPr lang="it-IT" dirty="0" smtClean="0"/>
-              <a:t>Nota : Possibili</a:t>
-            </a:r>
-            <a:r>
-              <a:rPr lang="it-IT" baseline="0" dirty="0" smtClean="0"/>
-              <a:t> cenni su operazioni.</a:t>
-            </a:r>
+            <a:pPr algn="just"/>
+            <a:r>
+              <a:rPr lang="it-IT" sz="1200" dirty="0" smtClean="0"/>
+              <a:t>Un altro obiettivo di design che ci siamo prefissati è quello di fornire una risposta ad una qualsiasi operazione eseguita dall’utente</a:t>
+            </a:r>
+            <a:r>
+              <a:rPr lang="it-IT" sz="1200" baseline="0" dirty="0" smtClean="0"/>
+              <a:t> entro e non oltre i 5 secondi.</a:t>
+            </a:r>
+          </a:p>
+          <a:p>
+            <a:pPr algn="just"/>
+            <a:r>
+              <a:rPr lang="it-IT" sz="1200" baseline="0" dirty="0" smtClean="0"/>
+              <a:t>Per favorire queste performance ad esempio, nella gestione delle graduatorie, vengono filtrati a priori i risultati in modo tale che l’utente riceva velocemente una risposta </a:t>
+            </a:r>
+            <a:endParaRPr lang="it-IT" sz="1200" dirty="0" smtClean="0"/>
+          </a:p>
+          <a:p>
+            <a:endParaRPr lang="it-IT" dirty="0" smtClean="0"/>
+          </a:p>
+          <a:p>
             <a:endParaRPr lang="it-IT" dirty="0"/>
           </a:p>
         </p:txBody>
@@ -1522,7 +1537,7 @@
             <a:fld id="{D70604CA-7593-4640-8FA1-5523937B8510}" type="slidenum">
               <a:rPr lang="it-IT" smtClean="0"/>
               <a:pPr/>
-              <a:t>41</a:t>
+              <a:t>40</a:t>
             </a:fld>
             <a:endParaRPr lang="it-IT"/>
           </a:p>
@@ -1582,103 +1597,26 @@
           </a:bodyPr>
           <a:lstStyle/>
           <a:p>
-            <a:pPr marL="514350" indent="-514350">
-              <a:buFont typeface="+mj-lt"/>
-              <a:buAutoNum type="arabicParenR"/>
-            </a:pPr>
-            <a:r>
-              <a:rPr lang="it-IT" sz="1200" b="1" dirty="0" err="1" smtClean="0"/>
-              <a:t>Presentation</a:t>
-            </a:r>
-            <a:r>
-              <a:rPr lang="it-IT" sz="1200" b="1" dirty="0" smtClean="0"/>
-              <a:t>: </a:t>
-            </a:r>
-            <a:r>
-              <a:rPr lang="it-IT" sz="1200" dirty="0" smtClean="0"/>
-              <a:t>raccoglie i sottosistemi adibiti alla gestione delle interfacce grafiche:</a:t>
-            </a:r>
-          </a:p>
-          <a:p>
-            <a:pPr marL="514350" indent="-514350">
-              <a:buFont typeface="+mj-lt"/>
-              <a:buAutoNum type="arabicParenR"/>
-            </a:pPr>
-            <a:r>
-              <a:rPr lang="it-IT" sz="1200" b="1" dirty="0" err="1" smtClean="0"/>
-              <a:t>Application</a:t>
-            </a:r>
-            <a:r>
-              <a:rPr lang="it-IT" sz="1200" dirty="0" smtClean="0"/>
-              <a:t>: si occupa della gestione della logica applicativa del sistema;</a:t>
-            </a:r>
-          </a:p>
-          <a:p>
-            <a:pPr marL="514350" indent="-514350"/>
-            <a:r>
-              <a:rPr lang="it-IT" sz="1200" b="1" dirty="0" smtClean="0"/>
-              <a:t>3)</a:t>
-            </a:r>
-            <a:r>
-              <a:rPr lang="it-IT" sz="1200" b="1" baseline="0" dirty="0" smtClean="0"/>
-              <a:t> </a:t>
-            </a:r>
-            <a:r>
-              <a:rPr lang="it-IT" sz="1200" b="1" dirty="0" err="1" smtClean="0"/>
-              <a:t>Beans</a:t>
-            </a:r>
-            <a:r>
-              <a:rPr lang="it-IT" sz="1200" dirty="0" smtClean="0"/>
-              <a:t>: si occupa della gestione e dello scambio dei dati tra i sistemi; </a:t>
-            </a:r>
-          </a:p>
-          <a:p>
-            <a:pPr marL="514350" indent="-514350"/>
-            <a:r>
-              <a:rPr lang="it-IT" sz="1200" b="1" dirty="0" smtClean="0"/>
-              <a:t>5)	</a:t>
-            </a:r>
-            <a:r>
-              <a:rPr lang="it-IT" sz="1200" b="1" dirty="0" err="1" smtClean="0"/>
-              <a:t>Storage</a:t>
-            </a:r>
-            <a:r>
-              <a:rPr lang="it-IT" sz="1200" dirty="0" smtClean="0"/>
-              <a:t>: sistema che gestisce ed immagazzina i dati persistenti:</a:t>
-            </a:r>
-          </a:p>
-          <a:p>
-            <a:pPr marL="514350" indent="-514350"/>
-            <a:r>
-              <a:rPr lang="it-IT" sz="1200" b="1" dirty="0" smtClean="0"/>
-              <a:t>6)	</a:t>
-            </a:r>
-            <a:r>
-              <a:rPr lang="it-IT" sz="1200" b="1" dirty="0" err="1" smtClean="0"/>
-              <a:t>Exception</a:t>
-            </a:r>
-            <a:r>
-              <a:rPr lang="it-IT" sz="1200" dirty="0" smtClean="0"/>
-              <a:t>: gestione delle eccezioni del sistema.</a:t>
-            </a:r>
-          </a:p>
-          <a:p>
-            <a:pPr marL="514350" indent="-514350">
-              <a:buFont typeface="+mj-lt"/>
-              <a:buNone/>
-            </a:pPr>
-            <a:endParaRPr lang="it-IT" sz="1200" b="1" dirty="0" smtClean="0"/>
+            <a:r>
+              <a:rPr lang="it-IT" dirty="0" smtClean="0"/>
+              <a:t>Il</a:t>
+            </a:r>
+            <a:r>
+              <a:rPr lang="it-IT" baseline="0" dirty="0" smtClean="0"/>
+              <a:t> nostro sistema è facile d’apprendere grazie ad un interfaccia semplice con bottoni provvisti di nomi univoci e non ambigui che permettono all’utente di utilizzare facilmente il nostro sistema.</a:t>
+            </a:r>
+            <a:endParaRPr lang="it-IT" dirty="0"/>
           </a:p>
         </p:txBody>
       </p:sp>
       <p:sp>
         <p:nvSpPr>
-          <p:cNvPr id="4" name="Segnaposto piè di pagina 3"/>
+          <p:cNvPr id="4" name="Segnaposto numero diapositiva 3"/>
           <p:cNvSpPr>
             <a:spLocks noGrp="1"/>
           </p:cNvSpPr>
           <p:nvPr>
-            <p:ph type="ftr" sz="quarter" idx="10"/>
+            <p:ph type="sldNum" sz="quarter" idx="10"/>
           </p:nvPr>
         </p:nvSpPr>
         <p:spPr/>
@@ -1686,29 +1624,10 @@
           <a:bodyPr/>
           <a:lstStyle/>
           <a:p>
-            <a:endParaRPr lang="it-IT"/>
-          </a:p>
-        </p:txBody>
-      </p:sp>
-      <p:sp>
-        <p:nvSpPr>
-          <p:cNvPr id="5" name="Segnaposto numero diapositiva 4"/>
-          <p:cNvSpPr>
-            <a:spLocks noGrp="1"/>
-          </p:cNvSpPr>
-          <p:nvPr>
-            <p:ph type="sldNum" sz="quarter" idx="11"/>
-          </p:nvPr>
-        </p:nvSpPr>
-        <p:spPr/>
-        <p:txBody>
-          <a:bodyPr/>
-          <a:lstStyle/>
-          <a:p>
             <a:fld id="{D70604CA-7593-4640-8FA1-5523937B8510}" type="slidenum">
               <a:rPr lang="it-IT" smtClean="0"/>
               <a:pPr/>
-              <a:t>42</a:t>
+              <a:t>41</a:t>
             </a:fld>
             <a:endParaRPr lang="it-IT"/>
           </a:p>
@@ -1855,9 +1774,6 @@
             </a:pPr>
             <a:endParaRPr lang="it-IT" sz="1200" b="1" dirty="0" smtClean="0"/>
           </a:p>
-          <a:p>
-            <a:endParaRPr lang="it-IT" dirty="0"/>
-          </a:p>
         </p:txBody>
       </p:sp>
       <p:sp>
@@ -1897,7 +1813,7 @@
             <a:fld id="{D70604CA-7593-4640-8FA1-5523937B8510}" type="slidenum">
               <a:rPr lang="it-IT" smtClean="0"/>
               <a:pPr/>
-              <a:t>43</a:t>
+              <a:t>42</a:t>
             </a:fld>
             <a:endParaRPr lang="it-IT"/>
           </a:p>
@@ -1996,7 +1912,7 @@
     </p:spTree>
     <p:extLst>
       <p:ext uri="{BB962C8B-B14F-4D97-AF65-F5344CB8AC3E}">
-        <p14:creationId xmlns:p14="http://schemas.microsoft.com/office/powerpoint/2010/main" xmlns="" val="3122029082"/>
+        <p14:creationId xmlns="" xmlns:p14="http://schemas.microsoft.com/office/powerpoint/2010/main" val="3122029082"/>
       </p:ext>
     </p:extLst>
   </p:cSld>
@@ -2052,34 +1968,106 @@
           </a:bodyPr>
           <a:lstStyle/>
           <a:p>
-            <a:r>
-              <a:rPr lang="it-IT" dirty="0" err="1" smtClean="0"/>
-              <a:t>…anche</a:t>
-            </a:r>
-            <a:r>
-              <a:rPr lang="it-IT" dirty="0" smtClean="0"/>
+            <a:pPr marL="514350" indent="-514350">
+              <a:buFont typeface="+mj-lt"/>
+              <a:buAutoNum type="arabicParenR"/>
+            </a:pPr>
+            <a:r>
+              <a:rPr lang="it-IT" sz="1200" b="1" dirty="0" err="1" smtClean="0"/>
+              <a:t>Presentation</a:t>
+            </a:r>
+            <a:r>
+              <a:rPr lang="it-IT" sz="1200" b="1" dirty="0" smtClean="0"/>
+              <a:t>: </a:t>
+            </a:r>
+            <a:r>
+              <a:rPr lang="it-IT" sz="1200" dirty="0" smtClean="0"/>
+              <a:t>raccoglie i sottosistemi adibiti alla gestione delle interfacce grafiche:</a:t>
+            </a:r>
+          </a:p>
+          <a:p>
+            <a:pPr marL="514350" indent="-514350">
+              <a:buFont typeface="+mj-lt"/>
+              <a:buAutoNum type="arabicParenR"/>
+            </a:pPr>
+            <a:r>
+              <a:rPr lang="it-IT" sz="1200" b="1" dirty="0" err="1" smtClean="0"/>
+              <a:t>Application</a:t>
+            </a:r>
+            <a:r>
+              <a:rPr lang="it-IT" sz="1200" dirty="0" smtClean="0"/>
+              <a:t>: si occupa della gestione della logica applicativa del sistema;</a:t>
+            </a:r>
+          </a:p>
+          <a:p>
+            <a:pPr marL="514350" indent="-514350"/>
+            <a:r>
+              <a:rPr lang="it-IT" sz="1200" b="1" dirty="0" smtClean="0"/>
+              <a:t>3)</a:t>
+            </a:r>
+            <a:r>
+              <a:rPr lang="it-IT" sz="1200" b="1" baseline="0" dirty="0" smtClean="0"/>
               <a:t> </a:t>
             </a:r>
             <a:r>
-              <a:rPr lang="it-IT" dirty="0" err="1" smtClean="0"/>
-              <a:t>Presentation</a:t>
-            </a:r>
-            <a:r>
-              <a:rPr lang="it-IT" dirty="0" smtClean="0"/>
-              <a:t> era diviso in 3 sottosistemi</a:t>
-            </a:r>
+              <a:rPr lang="it-IT" sz="1200" b="1" dirty="0" err="1" smtClean="0"/>
+              <a:t>Beans</a:t>
+            </a:r>
+            <a:r>
+              <a:rPr lang="it-IT" sz="1200" dirty="0" smtClean="0"/>
+              <a:t>: si occupa della gestione e dello scambio dei dati tra i sistemi; </a:t>
+            </a:r>
+          </a:p>
+          <a:p>
+            <a:pPr marL="514350" indent="-514350"/>
+            <a:r>
+              <a:rPr lang="it-IT" sz="1200" b="1" dirty="0" smtClean="0"/>
+              <a:t>5)	</a:t>
+            </a:r>
+            <a:r>
+              <a:rPr lang="it-IT" sz="1200" b="1" dirty="0" err="1" smtClean="0"/>
+              <a:t>Storage</a:t>
+            </a:r>
+            <a:r>
+              <a:rPr lang="it-IT" sz="1200" dirty="0" smtClean="0"/>
+              <a:t>: sistema che gestisce ed immagazzina i dati persistenti:</a:t>
+            </a:r>
+          </a:p>
+          <a:p>
+            <a:pPr marL="514350" indent="-514350"/>
+            <a:r>
+              <a:rPr lang="it-IT" sz="1200" b="1" dirty="0" smtClean="0"/>
+              <a:t>6)	</a:t>
+            </a:r>
+            <a:r>
+              <a:rPr lang="it-IT" sz="1200" b="1" dirty="0" err="1" smtClean="0"/>
+              <a:t>Exception</a:t>
+            </a:r>
+            <a:r>
+              <a:rPr lang="it-IT" sz="1200" dirty="0" smtClean="0"/>
+              <a:t>: gestione delle eccezioni del sistema.</a:t>
+            </a:r>
+          </a:p>
+          <a:p>
+            <a:pPr marL="514350" indent="-514350">
+              <a:buFont typeface="+mj-lt"/>
+              <a:buNone/>
+            </a:pPr>
+            <a:endParaRPr lang="it-IT" sz="1200" b="1" dirty="0" smtClean="0"/>
+          </a:p>
+          <a:p>
             <a:endParaRPr lang="it-IT" dirty="0"/>
           </a:p>
         </p:txBody>
       </p:sp>
       <p:sp>
         <p:nvSpPr>
-          <p:cNvPr id="4" name="Segnaposto numero diapositiva 3"/>
+          <p:cNvPr id="4" name="Segnaposto piè di pagina 3"/>
           <p:cNvSpPr>
             <a:spLocks noGrp="1"/>
           </p:cNvSpPr>
           <p:nvPr>
-            <p:ph type="sldNum" sz="quarter" idx="10"/>
+            <p:ph type="ftr" sz="quarter" idx="10"/>
           </p:nvPr>
         </p:nvSpPr>
         <p:spPr/>
@@ -2087,10 +2075,29 @@
           <a:bodyPr/>
           <a:lstStyle/>
           <a:p>
+            <a:endParaRPr lang="it-IT"/>
+          </a:p>
+        </p:txBody>
+      </p:sp>
+      <p:sp>
+        <p:nvSpPr>
+          <p:cNvPr id="5" name="Segnaposto numero diapositiva 4"/>
+          <p:cNvSpPr>
+            <a:spLocks noGrp="1"/>
+          </p:cNvSpPr>
+          <p:nvPr>
+            <p:ph type="sldNum" sz="quarter" idx="11"/>
+          </p:nvPr>
+        </p:nvSpPr>
+        <p:spPr/>
+        <p:txBody>
+          <a:bodyPr/>
+          <a:lstStyle/>
+          <a:p>
             <a:fld id="{D70604CA-7593-4640-8FA1-5523937B8510}" type="slidenum">
               <a:rPr lang="it-IT" smtClean="0"/>
               <a:pPr/>
-              <a:t>44</a:t>
+              <a:t>43</a:t>
             </a:fld>
             <a:endParaRPr lang="it-IT"/>
           </a:p>
@@ -2151,20 +2158,20 @@
           <a:lstStyle/>
           <a:p>
             <a:r>
+              <a:rPr lang="it-IT" dirty="0" err="1" smtClean="0"/>
+              <a:t>…anche</a:t>
+            </a:r>
+            <a:r>
               <a:rPr lang="it-IT" dirty="0" smtClean="0"/>
-              <a:t>In </a:t>
+              <a:t> </a:t>
             </a:r>
             <a:r>
               <a:rPr lang="it-IT" dirty="0" err="1" smtClean="0"/>
               <a:t>Presentation</a:t>
             </a:r>
             <a:r>
-              <a:rPr lang="it-IT" baseline="0" dirty="0" smtClean="0"/>
-              <a:t> </a:t>
-            </a:r>
-            <a:r>
-              <a:rPr lang="it-IT" baseline="0" smtClean="0"/>
-              <a:t>2 sottosistemi</a:t>
+              <a:rPr lang="it-IT" dirty="0" smtClean="0"/>
+              <a:t> era diviso in 3 sottosistemi</a:t>
             </a:r>
             <a:endParaRPr lang="it-IT" dirty="0"/>
           </a:p>
@@ -2188,27 +2195,8 @@
             <a:fld id="{D70604CA-7593-4640-8FA1-5523937B8510}" type="slidenum">
               <a:rPr lang="it-IT" smtClean="0"/>
               <a:pPr/>
-              <a:t>47</a:t>
+              <a:t>44</a:t>
             </a:fld>
-            <a:endParaRPr lang="it-IT"/>
-          </a:p>
-        </p:txBody>
-      </p:sp>
-      <p:sp>
-        <p:nvSpPr>
-          <p:cNvPr id="5" name="Segnaposto piè di pagina 4"/>
-          <p:cNvSpPr>
-            <a:spLocks noGrp="1"/>
-          </p:cNvSpPr>
-          <p:nvPr>
-            <p:ph type="ftr" sz="quarter" idx="11"/>
-          </p:nvPr>
-        </p:nvSpPr>
-        <p:spPr/>
-        <p:txBody>
-          <a:bodyPr/>
-          <a:lstStyle/>
-          <a:p>
             <a:endParaRPr lang="it-IT"/>
           </a:p>
         </p:txBody>
@@ -2262,9 +2250,27 @@
         </p:nvSpPr>
         <p:spPr/>
         <p:txBody>
-          <a:bodyPr/>
+          <a:bodyPr>
+            <a:normAutofit/>
+          </a:bodyPr>
           <a:lstStyle/>
           <a:p>
+            <a:r>
+              <a:rPr lang="it-IT" dirty="0" smtClean="0"/>
+              <a:t>In </a:t>
+            </a:r>
+            <a:r>
+              <a:rPr lang="it-IT" dirty="0" err="1" smtClean="0"/>
+              <a:t>Presentation</a:t>
+            </a:r>
+            <a:r>
+              <a:rPr lang="it-IT" baseline="0" dirty="0" smtClean="0"/>
+              <a:t> </a:t>
+            </a:r>
+            <a:r>
+              <a:rPr lang="it-IT" baseline="0" smtClean="0"/>
+              <a:t>2 sottosistemi</a:t>
+            </a:r>
             <a:endParaRPr lang="it-IT" dirty="0"/>
           </a:p>
         </p:txBody>
@@ -2287,18 +2293,32 @@
             <a:fld id="{D70604CA-7593-4640-8FA1-5523937B8510}" type="slidenum">
               <a:rPr lang="it-IT" smtClean="0"/>
               <a:pPr/>
-              <a:t>55</a:t>
+              <a:t>47</a:t>
             </a:fld>
+            <a:endParaRPr lang="it-IT"/>
+          </a:p>
+        </p:txBody>
+      </p:sp>
+      <p:sp>
+        <p:nvSpPr>
+          <p:cNvPr id="5" name="Segnaposto piè di pagina 4"/>
+          <p:cNvSpPr>
+            <a:spLocks noGrp="1"/>
+          </p:cNvSpPr>
+          <p:nvPr>
+            <p:ph type="ftr" sz="quarter" idx="11"/>
+          </p:nvPr>
+        </p:nvSpPr>
+        <p:spPr/>
+        <p:txBody>
+          <a:bodyPr/>
+          <a:lstStyle/>
+          <a:p>
             <a:endParaRPr lang="it-IT"/>
           </a:p>
         </p:txBody>
       </p:sp>
     </p:spTree>
-    <p:extLst>
-      <p:ext uri="{BB962C8B-B14F-4D97-AF65-F5344CB8AC3E}">
-        <p14:creationId xmlns="" xmlns:p14="http://schemas.microsoft.com/office/powerpoint/2010/main" val="1015010449"/>
-      </p:ext>
-    </p:extLst>
   </p:cSld>
   <p:clrMapOvr>
     <a:masterClrMapping/>
@@ -2350,26 +2370,6 @@
           <a:bodyPr/>
           <a:lstStyle/>
           <a:p>
-            <a:r>
-              <a:rPr lang="it-IT" dirty="0" smtClean="0"/>
-              <a:t>L’implementazione è stata la fase di progettazione che ha ritardato la consegna del prodotto finale. Avendo creato un database iniziale, tutta l’implementazione è stata soggetta alle modifiche apportate alla base di dati. </a:t>
-            </a:r>
-          </a:p>
-          <a:p>
-            <a:r>
-              <a:rPr lang="it-IT" dirty="0" smtClean="0"/>
-              <a:t>Durante questa fase sono state trovate delle sbavature commesse in fase di </a:t>
-            </a:r>
-            <a:r>
-              <a:rPr lang="it-IT" dirty="0" err="1" smtClean="0"/>
-              <a:t>mapping</a:t>
-            </a:r>
-            <a:r>
-              <a:rPr lang="it-IT" dirty="0" smtClean="0"/>
-              <a:t> che ci hanno portato a produrre una base di dati incompleta e in alcuni punti sbagliata.</a:t>
-            </a:r>
-          </a:p>
-          <a:p>
             <a:endParaRPr lang="it-IT" dirty="0"/>
           </a:p>
         </p:txBody>
@@ -2392,7 +2392,7 @@
             <a:fld id="{D70604CA-7593-4640-8FA1-5523937B8510}" type="slidenum">
               <a:rPr lang="it-IT" smtClean="0"/>
               <a:pPr/>
-              <a:t>56</a:t>
+              <a:t>55</a:t>
             </a:fld>
             <a:endParaRPr lang="it-IT"/>
           </a:p>
@@ -2401,7 +2401,7 @@
     </p:spTree>
     <p:extLst>
       <p:ext uri="{BB962C8B-B14F-4D97-AF65-F5344CB8AC3E}">
-        <p14:creationId xmlns="" xmlns:p14="http://schemas.microsoft.com/office/powerpoint/2010/main" val="2697673236"/>
+        <p14:creationId xmlns:p14="http://schemas.microsoft.com/office/powerpoint/2010/main" xmlns="" val="1015010449"/>
       </p:ext>
     </p:extLst>
   </p:cSld>
@@ -2452,10 +2452,28 @@
         </p:nvSpPr>
         <p:spPr/>
         <p:txBody>
-          <a:bodyPr>
-            <a:normAutofit/>
-          </a:bodyPr>
+          <a:bodyPr/>
           <a:lstStyle/>
+          <a:p>
+            <a:r>
+              <a:rPr lang="it-IT" dirty="0" smtClean="0"/>
+              <a:t>L’implementazione è stata la fase di progettazione che ha ritardato la consegna del prodotto finale. Avendo creato un database iniziale, tutta l’implementazione è stata soggetta alle modifiche apportate alla base di dati. </a:t>
+            </a:r>
+          </a:p>
+          <a:p>
+            <a:r>
+              <a:rPr lang="it-IT" dirty="0" smtClean="0"/>
+              <a:t>Durante questa fase sono state trovate delle sbavature commesse in fase di </a:t>
+            </a:r>
+            <a:r>
+              <a:rPr lang="it-IT" dirty="0" err="1" smtClean="0"/>
+              <a:t>mapping</a:t>
+            </a:r>
+            <a:r>
+              <a:rPr lang="it-IT" dirty="0" smtClean="0"/>
+              <a:t> che ci hanno portato a produrre una base di dati incompleta e in alcuni punti sbagliata.</a:t>
+            </a:r>
+          </a:p>
           <a:p>
             <a:endParaRPr lang="it-IT" dirty="0"/>
           </a:p>
@@ -2479,13 +2497,18 @@
             <a:fld id="{D70604CA-7593-4640-8FA1-5523937B8510}" type="slidenum">
               <a:rPr lang="it-IT" smtClean="0"/>
               <a:pPr/>
-              <a:t>58</a:t>
+              <a:t>56</a:t>
             </a:fld>
             <a:endParaRPr lang="it-IT"/>
           </a:p>
         </p:txBody>
       </p:sp>
     </p:spTree>
+    <p:extLst>
+      <p:ext uri="{BB962C8B-B14F-4D97-AF65-F5344CB8AC3E}">
+        <p14:creationId xmlns:p14="http://schemas.microsoft.com/office/powerpoint/2010/main" xmlns="" val="2697673236"/>
+      </p:ext>
+    </p:extLst>
   </p:cSld>
   <p:clrMapOvr>
     <a:masterClrMapping/>
@@ -2561,7 +2584,7 @@
             <a:fld id="{D70604CA-7593-4640-8FA1-5523937B8510}" type="slidenum">
               <a:rPr lang="it-IT" smtClean="0"/>
               <a:pPr/>
-              <a:t>59</a:t>
+              <a:t>58</a:t>
             </a:fld>
             <a:endParaRPr lang="it-IT"/>
           </a:p>
@@ -2621,6 +2644,67 @@
           </a:bodyPr>
           <a:lstStyle/>
           <a:p>
+            <a:r>
+              <a:rPr lang="it-IT" dirty="0" smtClean="0"/>
+              <a:t>Le</a:t>
+            </a:r>
+            <a:r>
+              <a:rPr lang="it-IT" baseline="0" dirty="0" smtClean="0"/>
+              <a:t> possibili operazioni effettuate dal personale dell’asilo solo : </a:t>
+            </a:r>
+          </a:p>
+          <a:p>
+            <a:pPr>
+              <a:buFontTx/>
+              <a:buChar char="-"/>
+            </a:pPr>
+            <a:r>
+              <a:rPr lang="it-IT" baseline="0" dirty="0" smtClean="0"/>
+              <a:t>Visualizzazione degli eventi, previa scelta di giorno da calendario</a:t>
+            </a:r>
+          </a:p>
+          <a:p>
+            <a:pPr>
+              <a:buFontTx/>
+              <a:buChar char="-"/>
+            </a:pPr>
+            <a:r>
+              <a:rPr lang="it-IT" baseline="0" dirty="0" smtClean="0"/>
+              <a:t>Inserimento degli eventi per la data selezionata</a:t>
+            </a:r>
+          </a:p>
+          <a:p>
+            <a:pPr>
+              <a:buFontTx/>
+              <a:buChar char="-"/>
+            </a:pPr>
+            <a:r>
+              <a:rPr lang="it-IT" baseline="0" dirty="0" smtClean="0"/>
+              <a:t>Modifica degli eventi </a:t>
+            </a:r>
+          </a:p>
+          <a:p>
+            <a:pPr>
+              <a:buFontTx/>
+              <a:buNone/>
+            </a:pPr>
+            <a:r>
+              <a:rPr lang="it-IT" baseline="0" dirty="0" smtClean="0"/>
+              <a:t>-Rimozione degli eventi</a:t>
+            </a:r>
+          </a:p>
+          <a:p>
+            <a:pPr>
+              <a:buFontTx/>
+              <a:buNone/>
+            </a:pPr>
+            <a:r>
+              <a:rPr lang="it-IT" baseline="0" dirty="0" smtClean="0"/>
+              <a:t>-Allegare un file nell’inserimento e modifica.</a:t>
+            </a:r>
+            <a:endParaRPr lang="it-IT" dirty="0" smtClean="0"/>
+          </a:p>
+          <a:p>
             <a:endParaRPr lang="it-IT" dirty="0"/>
           </a:p>
         </p:txBody>
@@ -2643,7 +2727,7 @@
             <a:fld id="{D70604CA-7593-4640-8FA1-5523937B8510}" type="slidenum">
               <a:rPr lang="it-IT" smtClean="0"/>
               <a:pPr/>
-              <a:t>60</a:t>
+              <a:t>59</a:t>
             </a:fld>
             <a:endParaRPr lang="it-IT"/>
           </a:p>
@@ -2705,18 +2789,33 @@
           <a:p>
             <a:r>
               <a:rPr lang="it-IT" dirty="0" smtClean="0"/>
-              <a:t>Affidabilità :</a:t>
+              <a:t>Questo</a:t>
             </a:r>
             <a:r>
               <a:rPr lang="it-IT" baseline="0" dirty="0" smtClean="0"/>
-              <a:t> Non vengono rilevati comportamenti anomali. Non è possibile modificare eventi per i quali non abbiamo i permessi</a:t>
+              <a:t> è un esempio d’interfaccia relativa alla visualizzazione degli eventi per il giorno 21/12/2012</a:t>
             </a:r>
           </a:p>
           <a:p>
             <a:r>
               <a:rPr lang="it-IT" baseline="0" dirty="0" smtClean="0"/>
-              <a:t>Errori : In questo modo è difficile da introdurre errori e vengono anche controllati gli allegati.</a:t>
-            </a:r>
+              <a:t>In alto vengono mostrati gli eventi il cui autore è l’utente che ha effettuato il login. </a:t>
+            </a:r>
+          </a:p>
+          <a:p>
+            <a:r>
+              <a:rPr lang="it-IT" baseline="0" dirty="0" smtClean="0"/>
+              <a:t>In basso il resto degli eventi.</a:t>
+            </a:r>
+          </a:p>
+          <a:p>
+            <a:r>
+              <a:rPr lang="it-IT" baseline="0" dirty="0" smtClean="0"/>
+              <a:t>Soltanto l’utente che è l’autore di un evento può modificarlo. Gli eventi creati da altri verranno solo visualizzati senza possibilità di modificarli</a:t>
+            </a:r>
+            <a:endParaRPr lang="it-IT" dirty="0" smtClean="0"/>
+          </a:p>
+          <a:p>
             <a:endParaRPr lang="it-IT" dirty="0"/>
           </a:p>
         </p:txBody>
@@ -2739,7 +2838,7 @@
             <a:fld id="{D70604CA-7593-4640-8FA1-5523937B8510}" type="slidenum">
               <a:rPr lang="it-IT" smtClean="0"/>
               <a:pPr/>
-              <a:t>61</a:t>
+              <a:t>60</a:t>
             </a:fld>
             <a:endParaRPr lang="it-IT"/>
           </a:p>
@@ -2799,7 +2898,58 @@
           </a:bodyPr>
           <a:lstStyle/>
           <a:p>
-            <a:endParaRPr lang="it-IT" dirty="0"/>
+            <a:r>
+              <a:rPr lang="it-IT" dirty="0" smtClean="0"/>
+              <a:t>Durante</a:t>
+            </a:r>
+            <a:r>
+              <a:rPr lang="it-IT" baseline="0" dirty="0" smtClean="0"/>
+              <a:t> la realizzazione dell’interfaccia per la gestione degli eventi ci siamo trovati davanti ad un </a:t>
+            </a:r>
+            <a:r>
+              <a:rPr lang="it-IT" baseline="0" dirty="0" err="1" smtClean="0"/>
+              <a:t>trade</a:t>
+            </a:r>
+            <a:r>
+              <a:rPr lang="it-IT" baseline="0" dirty="0" smtClean="0"/>
+              <a:t> off a parer mio molto importante. La scelta era fra il supporto della sicurezza e dell’usabilità del sistema rispetto ad un aumento della complessità e </a:t>
+            </a:r>
+            <a:r>
+              <a:rPr lang="it-IT" baseline="0" dirty="0" err="1" smtClean="0"/>
+              <a:t>manutenibilità</a:t>
+            </a:r>
+            <a:r>
+              <a:rPr lang="it-IT" baseline="0" dirty="0" smtClean="0"/>
+              <a:t>.</a:t>
+            </a:r>
+          </a:p>
+          <a:p>
+            <a:endParaRPr lang="it-IT" baseline="0" dirty="0" smtClean="0"/>
+          </a:p>
+          <a:p>
+            <a:r>
+              <a:rPr lang="it-IT" baseline="0" dirty="0" smtClean="0"/>
+              <a:t>I pro di questa scelta sono che :</a:t>
+            </a:r>
+          </a:p>
+          <a:p>
+            <a:r>
+              <a:rPr lang="it-IT" baseline="0" dirty="0" smtClean="0"/>
+              <a:t>Ogni utente ha una propria interfaccia dove può eseguire solo le operazioni a lui associate</a:t>
+            </a:r>
+          </a:p>
+          <a:p>
+            <a:r>
+              <a:rPr lang="it-IT" baseline="0" dirty="0" smtClean="0"/>
+              <a:t>Ogni input (soprattutto nell’inserimento e modifica) viene controllato per evitare che vengano inseriti dati scorretti</a:t>
+            </a:r>
+          </a:p>
+          <a:p>
+            <a:r>
+              <a:rPr lang="it-IT" baseline="0" dirty="0" smtClean="0"/>
+              <a:t>La possibilità di ridurre errori è ridotta al minimo in quanto non vi è proprio la possibilità di accedere a funzioni che non sono state definite per la nostra tipologia d’utente.</a:t>
+            </a:r>
+            <a:endParaRPr lang="it-IT" baseline="0" dirty="0" smtClean="0"/>
           </a:p>
         </p:txBody>
       </p:sp>
@@ -2821,7 +2971,7 @@
             <a:fld id="{D70604CA-7593-4640-8FA1-5523937B8510}" type="slidenum">
               <a:rPr lang="it-IT" smtClean="0"/>
               <a:pPr/>
-              <a:t>62</a:t>
+              <a:t>61</a:t>
             </a:fld>
             <a:endParaRPr lang="it-IT"/>
           </a:p>
@@ -2881,6 +3031,40 @@
           </a:bodyPr>
           <a:lstStyle/>
           <a:p>
+            <a:r>
+              <a:rPr lang="it-IT" dirty="0" smtClean="0"/>
+              <a:t>I contro</a:t>
+            </a:r>
+            <a:r>
+              <a:rPr lang="it-IT" baseline="0" dirty="0" smtClean="0"/>
+              <a:t> sono</a:t>
+            </a:r>
+          </a:p>
+          <a:p>
+            <a:r>
+              <a:rPr lang="it-IT" baseline="0" dirty="0" smtClean="0"/>
+              <a:t> </a:t>
+            </a:r>
+          </a:p>
+          <a:p>
+            <a:r>
+              <a:rPr lang="it-IT" baseline="0" dirty="0" smtClean="0"/>
+              <a:t>Il sistema è più difficile da gestire e realizzare</a:t>
+            </a:r>
+          </a:p>
+          <a:p>
+            <a:r>
+              <a:rPr lang="it-IT" baseline="0" dirty="0" smtClean="0"/>
+              <a:t>Bisogna introdurre controlli su ogni tipologia d’utente e possibile input inserito</a:t>
+            </a:r>
+          </a:p>
+          <a:p>
+            <a:r>
+              <a:rPr lang="it-IT" baseline="0" dirty="0" smtClean="0"/>
+              <a:t>In caso d’aggiunta di nuove tipologie d’utenti andranno modificati ed aggiunti nuovi controlli compatibilmente con i vecchi già presenti</a:t>
+            </a:r>
+          </a:p>
+          <a:p>
             <a:endParaRPr lang="it-IT" dirty="0"/>
           </a:p>
         </p:txBody>
@@ -2903,7 +3087,7 @@
             <a:fld id="{D70604CA-7593-4640-8FA1-5523937B8510}" type="slidenum">
               <a:rPr lang="it-IT" smtClean="0"/>
               <a:pPr/>
-              <a:t>63</a:t>
+              <a:t>62</a:t>
             </a:fld>
             <a:endParaRPr lang="it-IT"/>
           </a:p>
@@ -2992,7 +3176,7 @@
     </p:spTree>
     <p:extLst>
       <p:ext uri="{BB962C8B-B14F-4D97-AF65-F5344CB8AC3E}">
-        <p14:creationId xmlns:p14="http://schemas.microsoft.com/office/powerpoint/2010/main" xmlns="" val="1632684865"/>
+        <p14:creationId xmlns="" xmlns:p14="http://schemas.microsoft.com/office/powerpoint/2010/main" val="1632684865"/>
       </p:ext>
     </p:extLst>
   </p:cSld>
@@ -3048,45 +3232,42 @@
           </a:bodyPr>
           <a:lstStyle/>
           <a:p>
+            <a:pPr marL="0" marR="0" indent="0" algn="l" defTabSz="914400" rtl="0" eaLnBrk="1" fontAlgn="auto" latinLnBrk="0" hangingPunct="1">
+              <a:lnSpc>
+                <a:spcPct val="100000"/>
+              </a:lnSpc>
+              <a:spcBef>
+                <a:spcPts val="0"/>
+              </a:spcBef>
+              <a:spcAft>
+                <a:spcPts val="0"/>
+              </a:spcAft>
+              <a:buClrTx/>
+              <a:buSzTx/>
+              <a:buFontTx/>
+              <a:buNone/>
+              <a:tabLst/>
+              <a:defRPr/>
+            </a:pPr>
+            <a:r>
+              <a:rPr lang="it-IT" dirty="0" smtClean="0"/>
+              <a:t>Si è scelto di supportare la</a:t>
+            </a:r>
             <a:r>
               <a:rPr lang="it-IT" baseline="0" dirty="0" smtClean="0"/>
-              <a:t>Nota numero 1: il singleton pattern viene utilizzato per evitare di creare un’istanza di </a:t>
+              <a:t> sicurezza e l’usabilità rispetto alla complessità e </a:t>
             </a:r>
             <a:r>
               <a:rPr lang="it-IT" baseline="0" dirty="0" err="1" smtClean="0"/>
-              <a:t>control</a:t>
+              <a:t>manutenibilità</a:t>
             </a:r>
             <a:r>
               <a:rPr lang="it-IT" baseline="0" dirty="0" smtClean="0"/>
-              <a:t> a ogni richiesta, poiché questo introdurrebbe un ritardo, e incrementerebbe l’utilizzo di memoria RAM.</a:t>
+              <a:t> in quanto requisito fondamentale del nostro sistema. In oltre non è stato possibile ricercare una soluzione che fornisse lo stesso livello di sicurezza con una complessità minore.</a:t>
             </a:r>
             <a:endParaRPr lang="it-IT" dirty="0" smtClean="0"/>
           </a:p>
           <a:p>
-            <a:r>
-              <a:rPr lang="it-IT" dirty="0" smtClean="0"/>
-              <a:t>Nota numero 2:</a:t>
-            </a:r>
-            <a:r>
-              <a:rPr lang="it-IT" baseline="0" dirty="0" smtClean="0"/>
-              <a:t> Non abbiamo variabili d’istanza per i </a:t>
-            </a:r>
-            <a:r>
-              <a:rPr lang="it-IT" baseline="0" dirty="0" err="1" smtClean="0"/>
-              <a:t>control</a:t>
-            </a:r>
-            <a:r>
-              <a:rPr lang="it-IT" baseline="0" dirty="0" smtClean="0"/>
-              <a:t>, poiché queste sarebbero accedute in concorrenza da più </a:t>
-            </a:r>
-            <a:r>
-              <a:rPr lang="it-IT" baseline="0" dirty="0" err="1" smtClean="0"/>
-              <a:t>thread</a:t>
-            </a:r>
-            <a:r>
-              <a:rPr lang="it-IT" baseline="0" dirty="0" smtClean="0"/>
-              <a:t>, e quindi si avrebbero problemi di concorrenza.</a:t>
-            </a:r>
             <a:endParaRPr lang="it-IT" dirty="0"/>
           </a:p>
         </p:txBody>
@@ -3109,7 +3290,7 @@
             <a:fld id="{D70604CA-7593-4640-8FA1-5523937B8510}" type="slidenum">
               <a:rPr lang="it-IT" smtClean="0"/>
               <a:pPr/>
-              <a:t>64</a:t>
+              <a:t>63</a:t>
             </a:fld>
             <a:endParaRPr lang="it-IT"/>
           </a:p>
@@ -3170,24 +3351,43 @@
           <a:lstStyle/>
           <a:p>
             <a:r>
-              <a:rPr lang="en-US" sz="1200" dirty="0" smtClean="0"/>
-              <a:t>input (</a:t>
-            </a:r>
-            <a:r>
-              <a:rPr lang="en-US" sz="1200" dirty="0" err="1" smtClean="0"/>
-              <a:t>validi</a:t>
-            </a:r>
-            <a:r>
-              <a:rPr lang="en-US" sz="1200" dirty="0" smtClean="0"/>
-              <a:t> e non </a:t>
-            </a:r>
-            <a:r>
-              <a:rPr lang="en-US" sz="1200" dirty="0" err="1" smtClean="0"/>
-              <a:t>validi</a:t>
-            </a:r>
-            <a:r>
-              <a:rPr lang="en-US" sz="1200" dirty="0" smtClean="0"/>
-              <a:t>)</a:t>
+              <a:rPr lang="it-IT" baseline="0" dirty="0" smtClean="0"/>
+              <a:t>Nota numero 1: il singleton pattern viene utilizzato per evitare di creare un’istanza di </a:t>
+            </a:r>
+            <a:r>
+              <a:rPr lang="it-IT" baseline="0" dirty="0" err="1" smtClean="0"/>
+              <a:t>control</a:t>
+            </a:r>
+            <a:r>
+              <a:rPr lang="it-IT" baseline="0" dirty="0" smtClean="0"/>
+              <a:t> a ogni richiesta, poiché questo introdurrebbe un ritardo, e incrementerebbe l’utilizzo di memoria RAM.</a:t>
+            </a:r>
+            <a:endParaRPr lang="it-IT" dirty="0" smtClean="0"/>
+          </a:p>
+          <a:p>
+            <a:r>
+              <a:rPr lang="it-IT" dirty="0" smtClean="0"/>
+              <a:t>Nota numero 2:</a:t>
+            </a:r>
+            <a:r>
+              <a:rPr lang="it-IT" baseline="0" dirty="0" smtClean="0"/>
+              <a:t> Non abbiamo variabili d’istanza per i </a:t>
+            </a:r>
+            <a:r>
+              <a:rPr lang="it-IT" baseline="0" dirty="0" err="1" smtClean="0"/>
+              <a:t>control</a:t>
+            </a:r>
+            <a:r>
+              <a:rPr lang="it-IT" baseline="0" dirty="0" smtClean="0"/>
+              <a:t>, poiché queste sarebbero accedute in concorrenza da più </a:t>
+            </a:r>
+            <a:r>
+              <a:rPr lang="it-IT" baseline="0" dirty="0" err="1" smtClean="0"/>
+              <a:t>thread</a:t>
+            </a:r>
+            <a:r>
+              <a:rPr lang="it-IT" baseline="0" dirty="0" smtClean="0"/>
+              <a:t>, e quindi si avrebbero problemi di concorrenza.</a:t>
             </a:r>
             <a:endParaRPr lang="it-IT" dirty="0"/>
           </a:p>
@@ -3195,12 +3395,12 @@
       </p:sp>
       <p:sp>
         <p:nvSpPr>
-          <p:cNvPr id="4" name="Segnaposto piè di pagina 3"/>
+          <p:cNvPr id="4" name="Segnaposto numero diapositiva 3"/>
           <p:cNvSpPr>
             <a:spLocks noGrp="1"/>
           </p:cNvSpPr>
           <p:nvPr>
-            <p:ph type="ftr" sz="quarter" idx="10"/>
+            <p:ph type="sldNum" sz="quarter" idx="10"/>
           </p:nvPr>
         </p:nvSpPr>
         <p:spPr/>
@@ -3208,29 +3408,10 @@
           <a:bodyPr/>
           <a:lstStyle/>
           <a:p>
-            <a:endParaRPr lang="it-IT"/>
-          </a:p>
-        </p:txBody>
-      </p:sp>
-      <p:sp>
-        <p:nvSpPr>
-          <p:cNvPr id="5" name="Segnaposto numero diapositiva 4"/>
-          <p:cNvSpPr>
-            <a:spLocks noGrp="1"/>
-          </p:cNvSpPr>
-          <p:nvPr>
-            <p:ph type="sldNum" sz="quarter" idx="11"/>
-          </p:nvPr>
-        </p:nvSpPr>
-        <p:spPr/>
-        <p:txBody>
-          <a:bodyPr/>
-          <a:lstStyle/>
-          <a:p>
             <a:fld id="{D70604CA-7593-4640-8FA1-5523937B8510}" type="slidenum">
               <a:rPr lang="it-IT" smtClean="0"/>
               <a:pPr/>
-              <a:t>65</a:t>
+              <a:t>64</a:t>
             </a:fld>
             <a:endParaRPr lang="it-IT"/>
           </a:p>
@@ -3290,153 +3471,27 @@
           </a:bodyPr>
           <a:lstStyle/>
           <a:p>
-            <a:pPr marL="0" marR="0" indent="0" algn="l" defTabSz="914400" rtl="0" eaLnBrk="1" fontAlgn="auto" latinLnBrk="0" hangingPunct="1">
-              <a:lnSpc>
-                <a:spcPct val="100000"/>
-              </a:lnSpc>
-              <a:spcBef>
-                <a:spcPts val="0"/>
-              </a:spcBef>
-              <a:spcAft>
-                <a:spcPts val="0"/>
-              </a:spcAft>
-              <a:buClrTx/>
-              <a:buSzTx/>
-              <a:buFontTx/>
-              <a:buNone/>
-              <a:tabLst/>
-              <a:defRPr/>
-            </a:pPr>
-            <a:r>
-              <a:rPr lang="it-IT" sz="1200" b="1" dirty="0" smtClean="0"/>
-              <a:t>PROBLEM</a:t>
-            </a:r>
-            <a:r>
-              <a:rPr lang="it-IT" sz="1200" b="1" baseline="0" dirty="0" smtClean="0"/>
-              <a:t> </a:t>
-            </a:r>
-            <a:r>
-              <a:rPr lang="it-IT" dirty="0" smtClean="0"/>
-              <a:t>Visto il poco tempo a disposizione, ed essendo forniti soltanto di una versione imparziale del sistema, non è stato possibile individuare test case basandosi esclusivamente sul </a:t>
-            </a:r>
-            <a:r>
-              <a:rPr lang="it-IT" dirty="0" err="1" smtClean="0"/>
-              <a:t>Weak</a:t>
-            </a:r>
-            <a:r>
-              <a:rPr lang="it-IT" dirty="0" smtClean="0"/>
-              <a:t> </a:t>
-            </a:r>
-            <a:r>
-              <a:rPr lang="it-IT" dirty="0" err="1" smtClean="0"/>
-              <a:t>Equivalance</a:t>
-            </a:r>
-            <a:r>
-              <a:rPr lang="it-IT" dirty="0" smtClean="0"/>
-              <a:t> </a:t>
-            </a:r>
-            <a:r>
-              <a:rPr lang="it-IT" dirty="0" err="1" smtClean="0"/>
-              <a:t>Class</a:t>
-            </a:r>
-            <a:r>
-              <a:rPr lang="it-IT" dirty="0" smtClean="0"/>
-              <a:t> </a:t>
-            </a:r>
-            <a:r>
-              <a:rPr lang="it-IT" dirty="0" err="1" smtClean="0"/>
-              <a:t>Testing</a:t>
-            </a:r>
-            <a:r>
-              <a:rPr lang="it-IT" dirty="0" smtClean="0"/>
-              <a:t> con </a:t>
-            </a:r>
-            <a:r>
-              <a:rPr lang="it-IT" dirty="0" err="1" smtClean="0"/>
-              <a:t>Boundary</a:t>
-            </a:r>
-            <a:r>
-              <a:rPr lang="it-IT" dirty="0" smtClean="0"/>
-              <a:t> </a:t>
-            </a:r>
-            <a:r>
-              <a:rPr lang="it-IT" dirty="0" err="1" smtClean="0"/>
-              <a:t>condition</a:t>
-            </a:r>
-            <a:r>
-              <a:rPr lang="it-IT" dirty="0" smtClean="0"/>
-              <a:t>, come previsto dal Test </a:t>
-            </a:r>
-            <a:r>
-              <a:rPr lang="it-IT" dirty="0" err="1" smtClean="0"/>
-              <a:t>Plan</a:t>
-            </a:r>
-            <a:r>
-              <a:rPr lang="it-IT" dirty="0" smtClean="0"/>
-              <a:t>.</a:t>
-            </a:r>
-          </a:p>
-          <a:p>
-            <a:pPr marL="0" marR="0" indent="0" algn="l" defTabSz="914400" rtl="0" eaLnBrk="1" fontAlgn="auto" latinLnBrk="0" hangingPunct="1">
-              <a:lnSpc>
-                <a:spcPct val="100000"/>
-              </a:lnSpc>
-              <a:spcBef>
-                <a:spcPts val="0"/>
-              </a:spcBef>
-              <a:spcAft>
-                <a:spcPts val="0"/>
-              </a:spcAft>
-              <a:buClrTx/>
-              <a:buSzTx/>
-              <a:buFontTx/>
-              <a:buNone/>
-              <a:tabLst/>
-              <a:defRPr/>
-            </a:pPr>
-            <a:r>
-              <a:rPr lang="it-IT" sz="1200" dirty="0" smtClean="0"/>
-              <a:t>Eseguito con il criterio di copertura debole(WECT): un input non valido per volta, tutti gli altri input corretti.</a:t>
-            </a:r>
-          </a:p>
-          <a:p>
-            <a:pPr>
-              <a:buFont typeface="Wingdings" pitchFamily="2" charset="2"/>
-              <a:buChar char="v"/>
-            </a:pPr>
-            <a:r>
-              <a:rPr lang="it-IT" sz="1200" dirty="0" smtClean="0"/>
-              <a:t>Per ogni </a:t>
-            </a:r>
-            <a:r>
-              <a:rPr lang="it-IT" sz="1200" dirty="0" err="1" smtClean="0"/>
-              <a:t>use</a:t>
-            </a:r>
-            <a:r>
-              <a:rPr lang="it-IT" sz="1200" dirty="0" smtClean="0"/>
-              <a:t> case ad alta priorità sono stati realizzati diversi test </a:t>
-            </a:r>
-            <a:r>
-              <a:rPr lang="it-IT" sz="1200" dirty="0" err="1" smtClean="0"/>
-              <a:t>cases</a:t>
-            </a:r>
-            <a:r>
-              <a:rPr lang="it-IT" sz="1200" dirty="0" smtClean="0"/>
-              <a:t>, realizzati seguendo il criterio di copertura debole (</a:t>
-            </a:r>
-            <a:r>
-              <a:rPr lang="it-IT" sz="1200" b="1" dirty="0" smtClean="0"/>
-              <a:t>WECT</a:t>
-            </a:r>
-            <a:r>
-              <a:rPr lang="it-IT" sz="1200" dirty="0" smtClean="0"/>
-              <a:t>): </a:t>
-            </a:r>
-            <a:r>
-              <a:rPr lang="it-IT" sz="1200" i="1" dirty="0" smtClean="0"/>
-              <a:t>un input non valido per volta, tutti gli altri input corretti.</a:t>
-            </a:r>
-            <a:endParaRPr lang="it-IT" sz="1200" dirty="0"/>
+            <a:r>
+              <a:rPr lang="en-US" sz="1200" dirty="0" smtClean="0"/>
+              <a:t>input (</a:t>
+            </a:r>
+            <a:r>
+              <a:rPr lang="en-US" sz="1200" dirty="0" err="1" smtClean="0"/>
+              <a:t>validi</a:t>
+            </a:r>
+            <a:r>
+              <a:rPr lang="en-US" sz="1200" dirty="0" smtClean="0"/>
+              <a:t> e non </a:t>
+            </a:r>
+            <a:r>
+              <a:rPr lang="en-US" sz="1200" dirty="0" err="1" smtClean="0"/>
+              <a:t>validi</a:t>
+            </a:r>
+            <a:r>
+              <a:rPr lang="en-US" sz="1200" dirty="0" smtClean="0"/>
+              <a:t>)</a:t>
+            </a:r>
+            <a:endParaRPr lang="it-IT" dirty="0"/>
           </a:p>
         </p:txBody>
       </p:sp>
@@ -3477,7 +3532,7 @@
             <a:fld id="{D70604CA-7593-4640-8FA1-5523937B8510}" type="slidenum">
               <a:rPr lang="it-IT" smtClean="0"/>
               <a:pPr/>
-              <a:t>66</a:t>
+              <a:t>65</a:t>
             </a:fld>
             <a:endParaRPr lang="it-IT"/>
           </a:p>
@@ -3537,23 +3592,153 @@
           </a:bodyPr>
           <a:lstStyle/>
           <a:p>
+            <a:pPr marL="0" marR="0" indent="0" algn="l" defTabSz="914400" rtl="0" eaLnBrk="1" fontAlgn="auto" latinLnBrk="0" hangingPunct="1">
+              <a:lnSpc>
+                <a:spcPct val="100000"/>
+              </a:lnSpc>
+              <a:spcBef>
+                <a:spcPts val="0"/>
+              </a:spcBef>
+              <a:spcAft>
+                <a:spcPts val="0"/>
+              </a:spcAft>
+              <a:buClrTx/>
+              <a:buSzTx/>
+              <a:buFontTx/>
+              <a:buNone/>
+              <a:tabLst/>
+              <a:defRPr/>
+            </a:pPr>
+            <a:r>
+              <a:rPr lang="it-IT" sz="1200" b="1" dirty="0" smtClean="0"/>
+              <a:t>PROBLEM</a:t>
+            </a:r>
+            <a:r>
+              <a:rPr lang="it-IT" sz="1200" b="1" baseline="0" dirty="0" smtClean="0"/>
+              <a:t> </a:t>
+            </a:r>
             <a:r>
               <a:rPr lang="it-IT" dirty="0" smtClean="0"/>
-              <a:t>Organizzazione della fase di </a:t>
+              <a:t>Visto il poco tempo a disposizione, ed essendo forniti soltanto di una versione imparziale del sistema, non è stato possibile individuare test case basandosi esclusivamente sul </a:t>
             </a:r>
             <a:r>
               <a:rPr lang="it-IT" dirty="0" err="1" smtClean="0"/>
-              <a:t>testing</a:t>
+              <a:t>Weak</a:t>
             </a:r>
             <a:r>
               <a:rPr lang="it-IT" dirty="0" smtClean="0"/>
-              <a:t>: </a:t>
-            </a:r>
-            <a:r>
-              <a:rPr lang="it-IT" i="1" dirty="0" smtClean="0"/>
-              <a:t>poiché spesso impossibilitati nel seguire la tracciabilità specificata;</a:t>
-            </a:r>
-            <a:endParaRPr lang="it-IT" dirty="0"/>
+              <a:t> </a:t>
+            </a:r>
+            <a:r>
+              <a:rPr lang="it-IT" dirty="0" err="1" smtClean="0"/>
+              <a:t>Equivalance</a:t>
+            </a:r>
+            <a:r>
+              <a:rPr lang="it-IT" dirty="0" smtClean="0"/>
+              <a:t> </a:t>
+            </a:r>
+            <a:r>
+              <a:rPr lang="it-IT" dirty="0" err="1" smtClean="0"/>
+              <a:t>Class</a:t>
+            </a:r>
+            <a:r>
+              <a:rPr lang="it-IT" dirty="0" smtClean="0"/>
+              <a:t> </a:t>
+            </a:r>
+            <a:r>
+              <a:rPr lang="it-IT" dirty="0" err="1" smtClean="0"/>
+              <a:t>Testing</a:t>
+            </a:r>
+            <a:r>
+              <a:rPr lang="it-IT" dirty="0" smtClean="0"/>
+              <a:t> con </a:t>
+            </a:r>
+            <a:r>
+              <a:rPr lang="it-IT" dirty="0" err="1" smtClean="0"/>
+              <a:t>Boundary</a:t>
+            </a:r>
+            <a:r>
+              <a:rPr lang="it-IT" dirty="0" smtClean="0"/>
+              <a:t> </a:t>
+            </a:r>
+            <a:r>
+              <a:rPr lang="it-IT" dirty="0" err="1" smtClean="0"/>
+              <a:t>condition</a:t>
+            </a:r>
+            <a:r>
+              <a:rPr lang="it-IT" dirty="0" smtClean="0"/>
+              <a:t>, come previsto dal Test </a:t>
+            </a:r>
+            <a:r>
+              <a:rPr lang="it-IT" dirty="0" err="1" smtClean="0"/>
+              <a:t>Plan</a:t>
+            </a:r>
+            <a:r>
+              <a:rPr lang="it-IT" dirty="0" smtClean="0"/>
+              <a:t>.</a:t>
+            </a:r>
+          </a:p>
+          <a:p>
+            <a:pPr marL="0" marR="0" indent="0" algn="l" defTabSz="914400" rtl="0" eaLnBrk="1" fontAlgn="auto" latinLnBrk="0" hangingPunct="1">
+              <a:lnSpc>
+                <a:spcPct val="100000"/>
+              </a:lnSpc>
+              <a:spcBef>
+                <a:spcPts val="0"/>
+              </a:spcBef>
+              <a:spcAft>
+                <a:spcPts val="0"/>
+              </a:spcAft>
+              <a:buClrTx/>
+              <a:buSzTx/>
+              <a:buFontTx/>
+              <a:buNone/>
+              <a:tabLst/>
+              <a:defRPr/>
+            </a:pPr>
+            <a:r>
+              <a:rPr lang="it-IT" sz="1200" dirty="0" smtClean="0"/>
+              <a:t>Eseguito con il criterio di copertura debole(WECT): un input non valido per volta, tutti gli altri input corretti.</a:t>
+            </a:r>
+          </a:p>
+          <a:p>
+            <a:pPr>
+              <a:buFont typeface="Wingdings" pitchFamily="2" charset="2"/>
+              <a:buChar char="v"/>
+            </a:pPr>
+            <a:r>
+              <a:rPr lang="it-IT" sz="1200" dirty="0" smtClean="0"/>
+              <a:t>Per ogni </a:t>
+            </a:r>
+            <a:r>
+              <a:rPr lang="it-IT" sz="1200" dirty="0" err="1" smtClean="0"/>
+              <a:t>use</a:t>
+            </a:r>
+            <a:r>
+              <a:rPr lang="it-IT" sz="1200" dirty="0" smtClean="0"/>
+              <a:t> case ad alta priorità sono stati realizzati diversi test </a:t>
+            </a:r>
+            <a:r>
+              <a:rPr lang="it-IT" sz="1200" dirty="0" err="1" smtClean="0"/>
+              <a:t>cases</a:t>
+            </a:r>
+            <a:r>
+              <a:rPr lang="it-IT" sz="1200" dirty="0" smtClean="0"/>
+              <a:t>, realizzati seguendo il criterio di copertura debole (</a:t>
+            </a:r>
+            <a:r>
+              <a:rPr lang="it-IT" sz="1200" b="1" dirty="0" smtClean="0"/>
+              <a:t>WECT</a:t>
+            </a:r>
+            <a:r>
+              <a:rPr lang="it-IT" sz="1200" dirty="0" smtClean="0"/>
+              <a:t>): </a:t>
+            </a:r>
+            <a:r>
+              <a:rPr lang="it-IT" sz="1200" i="1" dirty="0" smtClean="0"/>
+              <a:t>un input non valido per volta, tutti gli altri input corretti.</a:t>
+            </a:r>
+            <a:endParaRPr lang="it-IT" sz="1200" dirty="0"/>
           </a:p>
         </p:txBody>
       </p:sp>
@@ -3594,7 +3779,7 @@
             <a:fld id="{D70604CA-7593-4640-8FA1-5523937B8510}" type="slidenum">
               <a:rPr lang="it-IT" smtClean="0"/>
               <a:pPr/>
-              <a:t>69</a:t>
+              <a:t>66</a:t>
             </a:fld>
             <a:endParaRPr lang="it-IT"/>
           </a:p>
@@ -3656,63 +3841,19 @@
           <a:p>
             <a:r>
               <a:rPr lang="it-IT" dirty="0" smtClean="0"/>
-              <a:t>Difficoltà dovuta ad </a:t>
-            </a:r>
-          </a:p>
-          <a:p>
+              <a:t>Organizzazione della fase di </a:t>
+            </a:r>
+            <a:r>
+              <a:rPr lang="it-IT" dirty="0" err="1" smtClean="0"/>
+              <a:t>testing</a:t>
+            </a:r>
             <a:r>
               <a:rPr lang="it-IT" dirty="0" smtClean="0"/>
-              <a:t>- inesperienza (è</a:t>
-            </a:r>
-            <a:r>
-              <a:rPr lang="it-IT" baseline="0" dirty="0" smtClean="0"/>
-              <a:t> stata la prima esperienza progettuale per tutti noi)</a:t>
-            </a:r>
-            <a:r>
-              <a:rPr lang="it-IT" dirty="0" smtClean="0"/>
-              <a:t>, </a:t>
-            </a:r>
-          </a:p>
-          <a:p>
-            <a:pPr>
-              <a:buFontTx/>
-              <a:buChar char="-"/>
-            </a:pPr>
-            <a:r>
-              <a:rPr lang="it-IT" dirty="0" err="1" smtClean="0"/>
-              <a:t>greenfield</a:t>
-            </a:r>
-            <a:r>
-              <a:rPr lang="it-IT" dirty="0" smtClean="0"/>
-              <a:t> </a:t>
-            </a:r>
-            <a:r>
-              <a:rPr lang="it-IT" dirty="0" err="1" smtClean="0"/>
-              <a:t>engeneering</a:t>
-            </a:r>
-            <a:r>
-              <a:rPr lang="it-IT" baseline="0" dirty="0" smtClean="0"/>
-              <a:t> (ambiente non noto e sistema realizzato completamente da capo), </a:t>
-            </a:r>
-          </a:p>
-          <a:p>
-            <a:pPr>
-              <a:buFontTx/>
-              <a:buChar char="-"/>
-            </a:pPr>
-            <a:r>
-              <a:rPr lang="it-IT" baseline="0" dirty="0" smtClean="0"/>
-              <a:t>tempo a disposizione</a:t>
-            </a:r>
-          </a:p>
-          <a:p>
-            <a:pPr>
-              <a:buFontTx/>
-              <a:buChar char="-"/>
-            </a:pPr>
-            <a:r>
-              <a:rPr lang="it-IT" baseline="0" dirty="0" smtClean="0"/>
-              <a:t> comunicazione tra 3 sottoteam</a:t>
+              <a:t>: </a:t>
+            </a:r>
+            <a:r>
+              <a:rPr lang="it-IT" i="1" dirty="0" smtClean="0"/>
+              <a:t>poiché spesso impossibilitati nel seguire la tracciabilità specificata;</a:t>
             </a:r>
             <a:endParaRPr lang="it-IT" dirty="0"/>
           </a:p>
@@ -3755,7 +3896,7 @@
             <a:fld id="{D70604CA-7593-4640-8FA1-5523937B8510}" type="slidenum">
               <a:rPr lang="it-IT" smtClean="0"/>
               <a:pPr/>
-              <a:t>70</a:t>
+              <a:t>69</a:t>
             </a:fld>
             <a:endParaRPr lang="it-IT"/>
           </a:p>
@@ -3815,28 +3956,24 @@
           </a:bodyPr>
           <a:lstStyle/>
           <a:p>
-            <a:pPr marL="0" marR="0" indent="0" algn="l" defTabSz="914400" rtl="0" eaLnBrk="1" fontAlgn="auto" latinLnBrk="0" hangingPunct="1">
-              <a:lnSpc>
-                <a:spcPct val="100000"/>
-              </a:lnSpc>
-              <a:spcBef>
-                <a:spcPts val="0"/>
-              </a:spcBef>
-              <a:spcAft>
-                <a:spcPts val="0"/>
-              </a:spcAft>
-              <a:buClrTx/>
-              <a:buSzTx/>
-              <a:buFontTx/>
-              <a:buChar char="-"/>
-              <a:tabLst/>
-              <a:defRPr/>
-            </a:pPr>
+            <a:r>
+              <a:rPr lang="it-IT" dirty="0" smtClean="0"/>
+              <a:t>Difficoltà dovuta ad </a:t>
+            </a:r>
+          </a:p>
+          <a:p>
+            <a:r>
+              <a:rPr lang="it-IT" dirty="0" smtClean="0"/>
+              <a:t>- inesperienza (è</a:t>
+            </a:r>
             <a:r>
               <a:rPr lang="it-IT" baseline="0" dirty="0" smtClean="0"/>
-              <a:t>Dopo diverse consultazioni con il committente, i requisiti sono cambiati, ma alla fine è stata realizzata una documentazione solida, flessibile. Per il team 2 le funzionalità dei tirocinanti, pagamenti e servizi rispettano questo requisito e sono quasi aderenti alle richieste del committente. La semplicità e  chiarezza sono i nostri punti di forza</a:t>
-            </a:r>
-            <a:endParaRPr lang="it-IT" dirty="0" smtClean="0"/>
+              <a:t> stata la prima esperienza progettuale per tutti noi)</a:t>
+            </a:r>
+            <a:r>
+              <a:rPr lang="it-IT" dirty="0" smtClean="0"/>
+              <a:t>, </a:t>
+            </a:r>
           </a:p>
           <a:p>
             <a:pPr>
@@ -3844,14 +3981,21 @@
               <a:buChar char="-"/>
             </a:pPr>
             <a:r>
+              <a:rPr lang="it-IT" dirty="0" err="1" smtClean="0"/>
+              <a:t>greenfield</a:t>
+            </a:r>
+            <a:r>
               <a:rPr lang="it-IT" dirty="0" smtClean="0"/>
-              <a:t>- Abbiamo cercato</a:t>
+              <a:t> </a:t>
+            </a:r>
+            <a:r>
+              <a:rPr lang="it-IT" dirty="0" err="1" smtClean="0"/>
+              <a:t>engeneering</a:t>
             </a:r>
             <a:r>
               <a:rPr lang="it-IT" baseline="0" dirty="0" smtClean="0"/>
-              <a:t> di attenerci il più possibile al sistema di riferimento</a:t>
-            </a:r>
-            <a:endParaRPr lang="it-IT" dirty="0" smtClean="0"/>
+              <a:t> (ambiente non noto e sistema realizzato completamente da capo), </a:t>
+            </a:r>
           </a:p>
           <a:p>
             <a:pPr>
@@ -3859,26 +4003,20 @@
               <a:buChar char="-"/>
             </a:pPr>
             <a:r>
-              <a:rPr lang="it-IT" dirty="0" smtClean="0"/>
-              <a:t>La divisione </a:t>
-            </a:r>
-            <a:r>
-              <a:rPr lang="it-IT" b="1" dirty="0" smtClean="0">
-                <a:solidFill>
-                  <a:schemeClr val="bg1"/>
-                </a:solidFill>
-              </a:rPr>
-              <a:t>orizzontale</a:t>
-            </a:r>
-            <a:r>
-              <a:rPr lang="it-IT" dirty="0" smtClean="0"/>
-              <a:t> delle responsabilità ha comportato una conoscenza quasi globale dei requisiti del sottosistema a tutti i team </a:t>
-            </a:r>
-            <a:r>
-              <a:rPr lang="it-IT" dirty="0" err="1" smtClean="0"/>
-              <a:t>members</a:t>
-            </a:r>
-            <a:endParaRPr lang="it-IT" dirty="0" smtClean="0"/>
+              <a:rPr lang="it-IT" baseline="0" dirty="0" smtClean="0"/>
+              <a:t>tempo a disposizione</a:t>
+            </a:r>
+          </a:p>
+          <a:p>
+            <a:pPr>
+              <a:buFontTx/>
+              <a:buChar char="-"/>
+            </a:pPr>
+            <a:r>
+              <a:rPr lang="it-IT" baseline="0" dirty="0" smtClean="0"/>
+              <a:t> comunicazione tra 3 sottoteam</a:t>
+            </a:r>
+            <a:endParaRPr lang="it-IT" dirty="0"/>
           </a:p>
         </p:txBody>
       </p:sp>
@@ -3919,7 +4057,7 @@
             <a:fld id="{D70604CA-7593-4640-8FA1-5523937B8510}" type="slidenum">
               <a:rPr lang="it-IT" smtClean="0"/>
               <a:pPr/>
-              <a:t>71</a:t>
+              <a:t>70</a:t>
             </a:fld>
             <a:endParaRPr lang="it-IT"/>
           </a:p>
@@ -3996,6 +4134,170 @@
               <a:tabLst/>
               <a:defRPr/>
             </a:pPr>
+            <a:r>
+              <a:rPr lang="it-IT" baseline="0" dirty="0" smtClean="0"/>
+              <a:t>Dopo diverse consultazioni con il committente, i requisiti sono cambiati, ma alla fine è stata realizzata una documentazione solida, flessibile. Per il team 2 le funzionalità dei tirocinanti, pagamenti e servizi rispettano questo requisito e sono quasi aderenti alle richieste del committente. La semplicità e  chiarezza sono i nostri punti di forza</a:t>
+            </a:r>
+            <a:endParaRPr lang="it-IT" dirty="0" smtClean="0"/>
+          </a:p>
+          <a:p>
+            <a:pPr>
+              <a:buFontTx/>
+              <a:buChar char="-"/>
+            </a:pPr>
+            <a:r>
+              <a:rPr lang="it-IT" dirty="0" smtClean="0"/>
+              <a:t>- Abbiamo cercato</a:t>
+            </a:r>
+            <a:r>
+              <a:rPr lang="it-IT" baseline="0" dirty="0" smtClean="0"/>
+              <a:t> di attenerci il più possibile al sistema di riferimento</a:t>
+            </a:r>
+            <a:endParaRPr lang="it-IT" dirty="0" smtClean="0"/>
+          </a:p>
+          <a:p>
+            <a:pPr>
+              <a:buFontTx/>
+              <a:buChar char="-"/>
+            </a:pPr>
+            <a:r>
+              <a:rPr lang="it-IT" dirty="0" smtClean="0"/>
+              <a:t>La divisione </a:t>
+            </a:r>
+            <a:r>
+              <a:rPr lang="it-IT" b="1" dirty="0" smtClean="0">
+                <a:solidFill>
+                  <a:schemeClr val="bg1"/>
+                </a:solidFill>
+              </a:rPr>
+              <a:t>orizzontale</a:t>
+            </a:r>
+            <a:r>
+              <a:rPr lang="it-IT" dirty="0" smtClean="0"/>
+              <a:t> delle responsabilità ha comportato una conoscenza quasi globale dei requisiti del sottosistema a tutti i team </a:t>
+            </a:r>
+            <a:r>
+              <a:rPr lang="it-IT" dirty="0" err="1" smtClean="0"/>
+              <a:t>members</a:t>
+            </a:r>
+            <a:endParaRPr lang="it-IT" dirty="0" smtClean="0"/>
+          </a:p>
+        </p:txBody>
+      </p:sp>
+      <p:sp>
+        <p:nvSpPr>
+          <p:cNvPr id="4" name="Segnaposto piè di pagina 3"/>
+          <p:cNvSpPr>
+            <a:spLocks noGrp="1"/>
+          </p:cNvSpPr>
+          <p:nvPr>
+            <p:ph type="ftr" sz="quarter" idx="10"/>
+          </p:nvPr>
+        </p:nvSpPr>
+        <p:spPr/>
+        <p:txBody>
+          <a:bodyPr/>
+          <a:lstStyle/>
+          <a:p>
+            <a:endParaRPr lang="it-IT"/>
+          </a:p>
+        </p:txBody>
+      </p:sp>
+      <p:sp>
+        <p:nvSpPr>
+          <p:cNvPr id="5" name="Segnaposto numero diapositiva 4"/>
+          <p:cNvSpPr>
+            <a:spLocks noGrp="1"/>
+          </p:cNvSpPr>
+          <p:nvPr>
+            <p:ph type="sldNum" sz="quarter" idx="11"/>
+          </p:nvPr>
+        </p:nvSpPr>
+        <p:spPr/>
+        <p:txBody>
+          <a:bodyPr/>
+          <a:lstStyle/>
+          <a:p>
+            <a:fld id="{D70604CA-7593-4640-8FA1-5523937B8510}" type="slidenum">
+              <a:rPr lang="it-IT" smtClean="0"/>
+              <a:pPr/>
+              <a:t>71</a:t>
+            </a:fld>
+            <a:endParaRPr lang="it-IT"/>
+          </a:p>
+        </p:txBody>
+      </p:sp>
+    </p:spTree>
+  </p:cSld>
+  <p:clrMapOvr>
+    <a:masterClrMapping/>
+  </p:clrMapOvr>
+</p:notes>
+</file>
+
+<file path=ppt/notesSlides/notesSlide37.xml><?xml version="1.0" encoding="utf-8"?>
+<p:notes xmlns:a="http://schemas.openxmlformats.org/drawingml/2006/main" xmlns:r="http://schemas.openxmlformats.org/officeDocument/2006/relationships" xmlns:p="http://schemas.openxmlformats.org/presentationml/2006/main">
+  <p:cSld>
+    <p:spTree>
+      <p:nvGrpSpPr>
+        <p:cNvPr id="1" name=""/>
+        <p:cNvGrpSpPr/>
+        <p:nvPr/>
+      </p:nvGrpSpPr>
+      <p:grpSpPr>
+        <a:xfrm>
+          <a:off x="0" y="0"/>
+          <a:ext cx="0" cy="0"/>
+          <a:chOff x="0" y="0"/>
+          <a:chExt cx="0" cy="0"/>
+        </a:xfrm>
+      </p:grpSpPr>
+      <p:sp>
+        <p:nvSpPr>
+          <p:cNvPr id="2" name="Segnaposto immagine diapositiva 1"/>
+          <p:cNvSpPr>
+            <a:spLocks noGrp="1" noRot="1" noChangeAspect="1"/>
+          </p:cNvSpPr>
+          <p:nvPr>
+            <p:ph type="sldImg"/>
+          </p:nvPr>
+        </p:nvSpPr>
+        <p:spPr/>
+      </p:sp>
+      <p:sp>
+        <p:nvSpPr>
+          <p:cNvPr id="3" name="Segnaposto note 2"/>
+          <p:cNvSpPr>
+            <a:spLocks noGrp="1"/>
+          </p:cNvSpPr>
+          <p:nvPr>
+            <p:ph type="body" idx="1"/>
+          </p:nvPr>
+        </p:nvSpPr>
+        <p:spPr/>
+        <p:txBody>
+          <a:bodyPr>
+            <a:normAutofit/>
+          </a:bodyPr>
+          <a:lstStyle/>
+          <a:p>
+            <a:pPr marL="0" marR="0" indent="0" algn="l" defTabSz="914400" rtl="0" eaLnBrk="1" fontAlgn="auto" latinLnBrk="0" hangingPunct="1">
+              <a:lnSpc>
+                <a:spcPct val="100000"/>
+              </a:lnSpc>
+              <a:spcBef>
+                <a:spcPts val="0"/>
+              </a:spcBef>
+              <a:spcAft>
+                <a:spcPts val="0"/>
+              </a:spcAft>
+              <a:buClrTx/>
+              <a:buSzTx/>
+              <a:buFontTx/>
+              <a:buChar char="-"/>
+              <a:tabLst/>
+              <a:defRPr/>
+            </a:pPr>
             <a:endParaRPr lang="it-IT" dirty="0" smtClean="0"/>
           </a:p>
         </p:txBody>
@@ -4126,7 +4428,7 @@
     </p:spTree>
     <p:extLst>
       <p:ext uri="{BB962C8B-B14F-4D97-AF65-F5344CB8AC3E}">
-        <p14:creationId xmlns:p14="http://schemas.microsoft.com/office/powerpoint/2010/main" xmlns="" val="1093366611"/>
+        <p14:creationId xmlns="" xmlns:p14="http://schemas.microsoft.com/office/powerpoint/2010/main" val="1093366611"/>
       </p:ext>
     </p:extLst>
   </p:cSld>
@@ -4225,7 +4527,7 @@
     </p:spTree>
     <p:extLst>
       <p:ext uri="{BB962C8B-B14F-4D97-AF65-F5344CB8AC3E}">
-        <p14:creationId xmlns:p14="http://schemas.microsoft.com/office/powerpoint/2010/main" xmlns="" val="968677491"/>
+        <p14:creationId xmlns="" xmlns:p14="http://schemas.microsoft.com/office/powerpoint/2010/main" val="968677491"/>
       </p:ext>
     </p:extLst>
   </p:cSld>
@@ -4318,7 +4620,7 @@
     </p:spTree>
     <p:extLst>
       <p:ext uri="{BB962C8B-B14F-4D97-AF65-F5344CB8AC3E}">
-        <p14:creationId xmlns:p14="http://schemas.microsoft.com/office/powerpoint/2010/main" xmlns="" val="1685022444"/>
+        <p14:creationId xmlns="" xmlns:p14="http://schemas.microsoft.com/office/powerpoint/2010/main" val="1685022444"/>
       </p:ext>
     </p:extLst>
   </p:cSld>
@@ -4415,7 +4717,7 @@
     </p:spTree>
     <p:extLst>
       <p:ext uri="{BB962C8B-B14F-4D97-AF65-F5344CB8AC3E}">
-        <p14:creationId xmlns:p14="http://schemas.microsoft.com/office/powerpoint/2010/main" xmlns="" val="1685022444"/>
+        <p14:creationId xmlns="" xmlns:p14="http://schemas.microsoft.com/office/powerpoint/2010/main" val="1685022444"/>
       </p:ext>
     </p:extLst>
   </p:cSld>
@@ -4500,7 +4802,7 @@
     </p:spTree>
     <p:extLst>
       <p:ext uri="{BB962C8B-B14F-4D97-AF65-F5344CB8AC3E}">
-        <p14:creationId xmlns:p14="http://schemas.microsoft.com/office/powerpoint/2010/main" xmlns="" val="3294237695"/>
+        <p14:creationId xmlns="" xmlns:p14="http://schemas.microsoft.com/office/powerpoint/2010/main" val="3294237695"/>
       </p:ext>
     </p:extLst>
   </p:cSld>
@@ -4585,7 +4887,7 @@
     </p:spTree>
     <p:extLst>
       <p:ext uri="{BB962C8B-B14F-4D97-AF65-F5344CB8AC3E}">
-        <p14:creationId xmlns:p14="http://schemas.microsoft.com/office/powerpoint/2010/main" xmlns="" val="328384907"/>
+        <p14:creationId xmlns="" xmlns:p14="http://schemas.microsoft.com/office/powerpoint/2010/main" val="328384907"/>
       </p:ext>
     </p:extLst>
   </p:cSld>
@@ -4761,7 +5063,7 @@
             <a:fld id="{63CABBC0-75E4-43BB-A6A6-84C2A96BDB82}" type="datetimeFigureOut">
               <a:rPr lang="it-IT" smtClean="0"/>
               <a:pPr/>
-              <a:t>04/01/2013</a:t>
+              <a:t>06/01/2013</a:t>
             </a:fld>
             <a:endParaRPr lang="it-IT"/>
           </a:p>
@@ -4943,7 +5245,7 @@
             <a:fld id="{63CABBC0-75E4-43BB-A6A6-84C2A96BDB82}" type="datetimeFigureOut">
               <a:rPr lang="it-IT" smtClean="0"/>
               <a:pPr/>
-              <a:t>04/01/2013</a:t>
+              <a:t>06/01/2013</a:t>
             </a:fld>
             <a:endParaRPr lang="it-IT"/>
           </a:p>
@@ -5135,7 +5437,7 @@
             <a:fld id="{63CABBC0-75E4-43BB-A6A6-84C2A96BDB82}" type="datetimeFigureOut">
               <a:rPr lang="it-IT" smtClean="0"/>
               <a:pPr/>
-              <a:t>04/01/2013</a:t>
+              <a:t>06/01/2013</a:t>
             </a:fld>
             <a:endParaRPr lang="it-IT"/>
           </a:p>
@@ -5317,7 +5619,7 @@
             <a:fld id="{63CABBC0-75E4-43BB-A6A6-84C2A96BDB82}" type="datetimeFigureOut">
               <a:rPr lang="it-IT" smtClean="0"/>
               <a:pPr/>
-              <a:t>04/01/2013</a:t>
+              <a:t>06/01/2013</a:t>
             </a:fld>
             <a:endParaRPr lang="it-IT"/>
           </a:p>
@@ -5560,7 +5862,7 @@
             <a:fld id="{63CABBC0-75E4-43BB-A6A6-84C2A96BDB82}" type="datetimeFigureOut">
               <a:rPr lang="it-IT" smtClean="0"/>
               <a:pPr/>
-              <a:t>04/01/2013</a:t>
+              <a:t>06/01/2013</a:t>
             </a:fld>
             <a:endParaRPr lang="it-IT"/>
           </a:p>
@@ -5841,7 +6143,7 @@
             <a:fld id="{63CABBC0-75E4-43BB-A6A6-84C2A96BDB82}" type="datetimeFigureOut">
               <a:rPr lang="it-IT" smtClean="0"/>
               <a:pPr/>
-              <a:t>04/01/2013</a:t>
+              <a:t>06/01/2013</a:t>
             </a:fld>
             <a:endParaRPr lang="it-IT"/>
           </a:p>
@@ -6232,7 +6534,7 @@
             <a:fld id="{63CABBC0-75E4-43BB-A6A6-84C2A96BDB82}" type="datetimeFigureOut">
               <a:rPr lang="it-IT" smtClean="0"/>
               <a:pPr/>
-              <a:t>04/01/2013</a:t>
+              <a:t>06/01/2013</a:t>
             </a:fld>
             <a:endParaRPr lang="it-IT"/>
           </a:p>
@@ -6391,7 +6693,7 @@
             <a:fld id="{63CABBC0-75E4-43BB-A6A6-84C2A96BDB82}" type="datetimeFigureOut">
               <a:rPr lang="it-IT" smtClean="0"/>
               <a:pPr/>
-              <a:t>04/01/2013</a:t>
+              <a:t>06/01/2013</a:t>
             </a:fld>
             <a:endParaRPr lang="it-IT"/>
           </a:p>
@@ -6490,7 +6792,7 @@
             <a:fld id="{63CABBC0-75E4-43BB-A6A6-84C2A96BDB82}" type="datetimeFigureOut">
               <a:rPr lang="it-IT" smtClean="0"/>
               <a:pPr/>
-              <a:t>04/01/2013</a:t>
+              <a:t>06/01/2013</a:t>
             </a:fld>
             <a:endParaRPr lang="it-IT"/>
           </a:p>
@@ -6760,7 +7062,7 @@
             <a:fld id="{63CABBC0-75E4-43BB-A6A6-84C2A96BDB82}" type="datetimeFigureOut">
               <a:rPr lang="it-IT" smtClean="0"/>
               <a:pPr/>
-              <a:t>04/01/2013</a:t>
+              <a:t>06/01/2013</a:t>
             </a:fld>
             <a:endParaRPr lang="it-IT"/>
           </a:p>
@@ -7057,7 +7359,7 @@
             <a:fld id="{63CABBC0-75E4-43BB-A6A6-84C2A96BDB82}" type="datetimeFigureOut">
               <a:rPr lang="it-IT" smtClean="0"/>
               <a:pPr/>
-              <a:t>04/01/2013</a:t>
+              <a:t>06/01/2013</a:t>
             </a:fld>
             <a:endParaRPr lang="it-IT"/>
           </a:p>
@@ -7837,7 +8139,7 @@
             <a:fld id="{63CABBC0-75E4-43BB-A6A6-84C2A96BDB82}" type="datetimeFigureOut">
               <a:rPr lang="it-IT" smtClean="0"/>
               <a:pPr/>
-              <a:t>04/01/2013</a:t>
+              <a:t>06/01/2013</a:t>
             </a:fld>
             <a:endParaRPr lang="it-IT"/>
           </a:p>
@@ -8520,14 +8822,14 @@
           <p:nvPr>
             <p:extLst>
               <p:ext uri="{D42A27DB-BD31-4B8C-83A1-F6EECF244321}">
-                <p14:modId xmlns:p14="http://schemas.microsoft.com/office/powerpoint/2010/main" xmlns="" val="3696521689"/>
+                <p14:modId xmlns="" xmlns:p14="http://schemas.microsoft.com/office/powerpoint/2010/main" val="3696521689"/>
               </p:ext>
             </p:extLst>
           </p:nvPr>
         </p:nvGraphicFramePr>
         <p:xfrm>
           <a:off x="7092280" y="6060793"/>
-          <a:ext cx="2051720" cy="792480"/>
+          <a:ext cx="2051720" cy="726314"/>
         </p:xfrm>
         <a:graphic>
           <a:graphicData uri="http://schemas.openxmlformats.org/drawingml/2006/table">
@@ -8610,7 +8912,7 @@
           <a:blip r:embed="rId2" cstate="print">
             <a:extLst>
               <a:ext uri="{28A0092B-C50C-407E-A947-70E740481C1C}">
-                <a14:useLocalDpi xmlns:a14="http://schemas.microsoft.com/office/drawing/2010/main" xmlns="" val="0"/>
+                <a14:useLocalDpi xmlns="" xmlns:a14="http://schemas.microsoft.com/office/drawing/2010/main" val="0"/>
               </a:ext>
             </a:extLst>
           </a:blip>
@@ -8630,7 +8932,7 @@
           <a:noFill/>
           <a:extLst>
             <a:ext uri="{909E8E84-426E-40DD-AFC4-6F175D3DCCD1}">
-              <a14:hiddenFill xmlns:a14="http://schemas.microsoft.com/office/drawing/2010/main" xmlns="">
+              <a14:hiddenFill xmlns="" xmlns:a14="http://schemas.microsoft.com/office/drawing/2010/main">
                 <a:solidFill>
                   <a:srgbClr val="FFFFFF"/>
                 </a:solidFill>
@@ -8648,7 +8950,7 @@
           <p:nvPr>
             <p:extLst>
               <p:ext uri="{D42A27DB-BD31-4B8C-83A1-F6EECF244321}">
-                <p14:modId xmlns:p14="http://schemas.microsoft.com/office/powerpoint/2010/main" xmlns="" val="3478576524"/>
+                <p14:modId xmlns="" xmlns:p14="http://schemas.microsoft.com/office/powerpoint/2010/main" val="3478576524"/>
               </p:ext>
             </p:extLst>
           </p:nvPr>
@@ -8859,7 +9161,7 @@
     </p:spTree>
     <p:extLst>
       <p:ext uri="{BB962C8B-B14F-4D97-AF65-F5344CB8AC3E}">
-        <p14:creationId xmlns:p14="http://schemas.microsoft.com/office/powerpoint/2010/main" xmlns="" val="4165334171"/>
+        <p14:creationId xmlns="" xmlns:p14="http://schemas.microsoft.com/office/powerpoint/2010/main" val="4165334171"/>
       </p:ext>
     </p:extLst>
   </p:cSld>
@@ -9135,7 +9437,7 @@
           <a:blip r:embed="rId2" cstate="print">
             <a:extLst>
               <a:ext uri="{28A0092B-C50C-407E-A947-70E740481C1C}">
-                <a14:useLocalDpi xmlns:a14="http://schemas.microsoft.com/office/drawing/2010/main" xmlns="" val="0"/>
+                <a14:useLocalDpi xmlns="" xmlns:a14="http://schemas.microsoft.com/office/drawing/2010/main" val="0"/>
               </a:ext>
             </a:extLst>
           </a:blip>
@@ -9155,7 +9457,7 @@
           <a:noFill/>
           <a:extLst>
             <a:ext uri="{909E8E84-426E-40DD-AFC4-6F175D3DCCD1}">
-              <a14:hiddenFill xmlns:a14="http://schemas.microsoft.com/office/drawing/2010/main" xmlns="">
+              <a14:hiddenFill xmlns="" xmlns:a14="http://schemas.microsoft.com/office/drawing/2010/main">
                 <a:solidFill>
                   <a:srgbClr val="FFFFFF"/>
                 </a:solidFill>
@@ -9431,7 +9733,7 @@
     </p:spTree>
     <p:extLst>
       <p:ext uri="{BB962C8B-B14F-4D97-AF65-F5344CB8AC3E}">
-        <p14:creationId xmlns:p14="http://schemas.microsoft.com/office/powerpoint/2010/main" xmlns="" val="4188503847"/>
+        <p14:creationId xmlns="" xmlns:p14="http://schemas.microsoft.com/office/powerpoint/2010/main" val="4188503847"/>
       </p:ext>
     </p:extLst>
   </p:cSld>
@@ -10299,7 +10601,7 @@
           <a:blip r:embed="rId2" cstate="print">
             <a:extLst>
               <a:ext uri="{28A0092B-C50C-407E-A947-70E740481C1C}">
-                <a14:useLocalDpi xmlns:a14="http://schemas.microsoft.com/office/drawing/2010/main" xmlns="" val="0"/>
+                <a14:useLocalDpi xmlns="" xmlns:a14="http://schemas.microsoft.com/office/drawing/2010/main" val="0"/>
               </a:ext>
             </a:extLst>
           </a:blip>
@@ -10323,14 +10625,14 @@
           <a:effectLst/>
           <a:extLst>
             <a:ext uri="{909E8E84-426E-40DD-AFC4-6F175D3DCCD1}">
-              <a14:hiddenFill xmlns:a14="http://schemas.microsoft.com/office/drawing/2010/main" xmlns="">
+              <a14:hiddenFill xmlns="" xmlns:a14="http://schemas.microsoft.com/office/drawing/2010/main">
                 <a:solidFill>
                   <a:schemeClr val="accent1"/>
                 </a:solidFill>
               </a14:hiddenFill>
             </a:ext>
             <a:ext uri="{91240B29-F687-4F45-9708-019B960494DF}">
-              <a14:hiddenLine xmlns:a14="http://schemas.microsoft.com/office/drawing/2010/main" xmlns="" w="9525">
+              <a14:hiddenLine xmlns="" xmlns:a14="http://schemas.microsoft.com/office/drawing/2010/main" w="9525">
                 <a:solidFill>
                   <a:schemeClr val="tx1"/>
                 </a:solidFill>
@@ -10340,7 +10642,7 @@
               </a14:hiddenLine>
             </a:ext>
             <a:ext uri="{AF507438-7753-43E0-B8FC-AC1667EBCBE1}">
-              <a14:hiddenEffects xmlns:a14="http://schemas.microsoft.com/office/drawing/2010/main" xmlns="">
+              <a14:hiddenEffects xmlns="" xmlns:a14="http://schemas.microsoft.com/office/drawing/2010/main">
                 <a:effectLst>
                   <a:outerShdw dist="35921" dir="2700000" algn="ctr" rotWithShape="0">
                     <a:schemeClr val="bg2"/>
@@ -10354,7 +10656,7 @@
     </p:spTree>
     <p:extLst>
       <p:ext uri="{BB962C8B-B14F-4D97-AF65-F5344CB8AC3E}">
-        <p14:creationId xmlns:p14="http://schemas.microsoft.com/office/powerpoint/2010/main" xmlns="" val="1896188625"/>
+        <p14:creationId xmlns="" xmlns:p14="http://schemas.microsoft.com/office/powerpoint/2010/main" val="1896188625"/>
       </p:ext>
     </p:extLst>
   </p:cSld>
@@ -10444,7 +10746,7 @@
           <a:blip r:embed="rId3" cstate="print">
             <a:extLst>
               <a:ext uri="{28A0092B-C50C-407E-A947-70E740481C1C}">
-                <a14:useLocalDpi xmlns:a14="http://schemas.microsoft.com/office/drawing/2010/main" xmlns="" val="0"/>
+                <a14:useLocalDpi xmlns="" xmlns:a14="http://schemas.microsoft.com/office/drawing/2010/main" val="0"/>
               </a:ext>
             </a:extLst>
           </a:blip>
@@ -10464,7 +10766,7 @@
           <a:noFill/>
           <a:extLst>
             <a:ext uri="{909E8E84-426E-40DD-AFC4-6F175D3DCCD1}">
-              <a14:hiddenFill xmlns:a14="http://schemas.microsoft.com/office/drawing/2010/main" xmlns="">
+              <a14:hiddenFill xmlns="" xmlns:a14="http://schemas.microsoft.com/office/drawing/2010/main">
                 <a:solidFill>
                   <a:srgbClr val="FFFFFF"/>
                 </a:solidFill>
@@ -10476,7 +10778,7 @@
     </p:spTree>
     <p:extLst>
       <p:ext uri="{BB962C8B-B14F-4D97-AF65-F5344CB8AC3E}">
-        <p14:creationId xmlns:p14="http://schemas.microsoft.com/office/powerpoint/2010/main" xmlns="" val="1417486241"/>
+        <p14:creationId xmlns="" xmlns:p14="http://schemas.microsoft.com/office/powerpoint/2010/main" val="1417486241"/>
       </p:ext>
     </p:extLst>
   </p:cSld>
@@ -10888,7 +11190,7 @@
     </p:spTree>
     <p:extLst>
       <p:ext uri="{BB962C8B-B14F-4D97-AF65-F5344CB8AC3E}">
-        <p14:creationId xmlns:p14="http://schemas.microsoft.com/office/powerpoint/2010/main" xmlns="" val="952316739"/>
+        <p14:creationId xmlns="" xmlns:p14="http://schemas.microsoft.com/office/powerpoint/2010/main" val="952316739"/>
       </p:ext>
     </p:extLst>
   </p:cSld>
@@ -10896,7 +11198,7 @@
     <a:masterClrMapping/>
   </p:clrMapOvr>
   <mc:AlternateContent xmlns:mc="http://schemas.openxmlformats.org/markup-compatibility/2006">
-    <mc:Choice xmlns:p14="http://schemas.microsoft.com/office/powerpoint/2010/main" xmlns="" Requires="p14">
+    <mc:Choice xmlns="" xmlns:p14="http://schemas.microsoft.com/office/powerpoint/2010/main" Requires="p14">
       <p:transition spd="slow" p14:dur="2000"/>
     </mc:Choice>
     <mc:Fallback>
@@ -11068,7 +11370,7 @@
           <a:blip r:embed="rId3" cstate="print">
             <a:extLst>
               <a:ext uri="{28A0092B-C50C-407E-A947-70E740481C1C}">
-                <a14:useLocalDpi xmlns:a14="http://schemas.microsoft.com/office/drawing/2010/main" xmlns="" val="0"/>
+                <a14:useLocalDpi xmlns="" xmlns:a14="http://schemas.microsoft.com/office/drawing/2010/main" val="0"/>
               </a:ext>
             </a:extLst>
           </a:blip>
@@ -11088,7 +11390,7 @@
           <a:noFill/>
           <a:extLst>
             <a:ext uri="{909E8E84-426E-40DD-AFC4-6F175D3DCCD1}">
-              <a14:hiddenFill xmlns:a14="http://schemas.microsoft.com/office/drawing/2010/main" xmlns="">
+              <a14:hiddenFill xmlns="" xmlns:a14="http://schemas.microsoft.com/office/drawing/2010/main">
                 <a:solidFill>
                   <a:srgbClr val="FFFFFF"/>
                 </a:solidFill>
@@ -11192,7 +11494,7 @@
     </p:spTree>
     <p:extLst>
       <p:ext uri="{BB962C8B-B14F-4D97-AF65-F5344CB8AC3E}">
-        <p14:creationId xmlns:p14="http://schemas.microsoft.com/office/powerpoint/2010/main" xmlns="" val="1824602548"/>
+        <p14:creationId xmlns="" xmlns:p14="http://schemas.microsoft.com/office/powerpoint/2010/main" val="1824602548"/>
       </p:ext>
     </p:extLst>
   </p:cSld>
@@ -11415,7 +11717,7 @@
           <a:blip r:embed="rId3" cstate="print">
             <a:extLst>
               <a:ext uri="{28A0092B-C50C-407E-A947-70E740481C1C}">
-                <a14:useLocalDpi xmlns:a14="http://schemas.microsoft.com/office/drawing/2010/main" xmlns="" val="0"/>
+                <a14:useLocalDpi xmlns="" xmlns:a14="http://schemas.microsoft.com/office/drawing/2010/main" val="0"/>
               </a:ext>
             </a:extLst>
           </a:blip>
@@ -11435,7 +11737,7 @@
           <a:noFill/>
           <a:extLst>
             <a:ext uri="{909E8E84-426E-40DD-AFC4-6F175D3DCCD1}">
-              <a14:hiddenFill xmlns:a14="http://schemas.microsoft.com/office/drawing/2010/main" xmlns="">
+              <a14:hiddenFill xmlns="" xmlns:a14="http://schemas.microsoft.com/office/drawing/2010/main">
                 <a:solidFill>
                   <a:srgbClr val="FFFFFF"/>
                 </a:solidFill>
@@ -11493,7 +11795,7 @@
     </p:spTree>
     <p:extLst>
       <p:ext uri="{BB962C8B-B14F-4D97-AF65-F5344CB8AC3E}">
-        <p14:creationId xmlns:p14="http://schemas.microsoft.com/office/powerpoint/2010/main" xmlns="" val="4209306795"/>
+        <p14:creationId xmlns="" xmlns:p14="http://schemas.microsoft.com/office/powerpoint/2010/main" val="4209306795"/>
       </p:ext>
     </p:extLst>
   </p:cSld>
@@ -11665,7 +11967,7 @@
           <a:blip r:embed="rId3" cstate="print">
             <a:extLst>
               <a:ext uri="{28A0092B-C50C-407E-A947-70E740481C1C}">
-                <a14:useLocalDpi xmlns:a14="http://schemas.microsoft.com/office/drawing/2010/main" xmlns="" val="0"/>
+                <a14:useLocalDpi xmlns="" xmlns:a14="http://schemas.microsoft.com/office/drawing/2010/main" val="0"/>
               </a:ext>
             </a:extLst>
           </a:blip>
@@ -11685,7 +11987,7 @@
           <a:noFill/>
           <a:extLst>
             <a:ext uri="{909E8E84-426E-40DD-AFC4-6F175D3DCCD1}">
-              <a14:hiddenFill xmlns:a14="http://schemas.microsoft.com/office/drawing/2010/main" xmlns="">
+              <a14:hiddenFill xmlns="" xmlns:a14="http://schemas.microsoft.com/office/drawing/2010/main">
                 <a:solidFill>
                   <a:srgbClr val="FFFFFF"/>
                 </a:solidFill>
@@ -11697,7 +11999,7 @@
     </p:spTree>
     <p:extLst>
       <p:ext uri="{BB962C8B-B14F-4D97-AF65-F5344CB8AC3E}">
-        <p14:creationId xmlns:p14="http://schemas.microsoft.com/office/powerpoint/2010/main" xmlns="" val="3701313841"/>
+        <p14:creationId xmlns="" xmlns:p14="http://schemas.microsoft.com/office/powerpoint/2010/main" val="3701313841"/>
       </p:ext>
     </p:extLst>
   </p:cSld>
@@ -11790,7 +12092,7 @@
           <a:blip r:embed="rId3" cstate="print">
             <a:extLst>
               <a:ext uri="{28A0092B-C50C-407E-A947-70E740481C1C}">
-                <a14:useLocalDpi xmlns:a14="http://schemas.microsoft.com/office/drawing/2010/main" xmlns="" val="0"/>
+                <a14:useLocalDpi xmlns="" xmlns:a14="http://schemas.microsoft.com/office/drawing/2010/main" val="0"/>
               </a:ext>
             </a:extLst>
           </a:blip>
@@ -11810,7 +12112,7 @@
           <a:noFill/>
           <a:extLst>
             <a:ext uri="{909E8E84-426E-40DD-AFC4-6F175D3DCCD1}">
-              <a14:hiddenFill xmlns:a14="http://schemas.microsoft.com/office/drawing/2010/main" xmlns="">
+              <a14:hiddenFill xmlns="" xmlns:a14="http://schemas.microsoft.com/office/drawing/2010/main">
                 <a:solidFill>
                   <a:srgbClr val="FFFFFF"/>
                 </a:solidFill>
@@ -11822,7 +12124,7 @@
     </p:spTree>
     <p:extLst>
       <p:ext uri="{BB962C8B-B14F-4D97-AF65-F5344CB8AC3E}">
-        <p14:creationId xmlns:p14="http://schemas.microsoft.com/office/powerpoint/2010/main" xmlns="" val="1653549512"/>
+        <p14:creationId xmlns="" xmlns:p14="http://schemas.microsoft.com/office/powerpoint/2010/main" val="1653549512"/>
       </p:ext>
     </p:extLst>
   </p:cSld>
@@ -11871,7 +12173,7 @@
           <a:blip r:embed="rId3" cstate="print">
             <a:extLst>
               <a:ext uri="{28A0092B-C50C-407E-A947-70E740481C1C}">
-                <a14:useLocalDpi xmlns:a14="http://schemas.microsoft.com/office/drawing/2010/main" xmlns="" val="0"/>
+                <a14:useLocalDpi xmlns="" xmlns:a14="http://schemas.microsoft.com/office/drawing/2010/main" val="0"/>
               </a:ext>
             </a:extLst>
           </a:blip>
@@ -11891,7 +12193,7 @@
           <a:noFill/>
           <a:extLst>
             <a:ext uri="{909E8E84-426E-40DD-AFC4-6F175D3DCCD1}">
-              <a14:hiddenFill xmlns:a14="http://schemas.microsoft.com/office/drawing/2010/main" xmlns="">
+              <a14:hiddenFill xmlns="" xmlns:a14="http://schemas.microsoft.com/office/drawing/2010/main">
                 <a:solidFill>
                   <a:srgbClr val="FFFFFF"/>
                 </a:solidFill>
@@ -11941,7 +12243,7 @@
     </p:spTree>
     <p:extLst>
       <p:ext uri="{BB962C8B-B14F-4D97-AF65-F5344CB8AC3E}">
-        <p14:creationId xmlns:p14="http://schemas.microsoft.com/office/powerpoint/2010/main" xmlns="" val="2424786554"/>
+        <p14:creationId xmlns="" xmlns:p14="http://schemas.microsoft.com/office/powerpoint/2010/main" val="2424786554"/>
       </p:ext>
     </p:extLst>
   </p:cSld>
@@ -12219,7 +12521,7 @@
           <a:blip r:embed="rId3" cstate="print">
             <a:extLst>
               <a:ext uri="{28A0092B-C50C-407E-A947-70E740481C1C}">
-                <a14:useLocalDpi xmlns:a14="http://schemas.microsoft.com/office/drawing/2010/main" xmlns="" val="0"/>
+                <a14:useLocalDpi xmlns="" xmlns:a14="http://schemas.microsoft.com/office/drawing/2010/main" val="0"/>
               </a:ext>
             </a:extLst>
           </a:blip>
@@ -12239,7 +12541,7 @@
           <a:noFill/>
           <a:extLst>
             <a:ext uri="{909E8E84-426E-40DD-AFC4-6F175D3DCCD1}">
-              <a14:hiddenFill xmlns:a14="http://schemas.microsoft.com/office/drawing/2010/main" xmlns="">
+              <a14:hiddenFill xmlns="" xmlns:a14="http://schemas.microsoft.com/office/drawing/2010/main">
                 <a:solidFill>
                   <a:srgbClr val="FFFFFF"/>
                 </a:solidFill>
@@ -12260,7 +12562,7 @@
           <a:blip r:embed="rId4" cstate="print">
             <a:extLst>
               <a:ext uri="{28A0092B-C50C-407E-A947-70E740481C1C}">
-                <a14:useLocalDpi xmlns:a14="http://schemas.microsoft.com/office/drawing/2010/main" xmlns="" val="0"/>
+                <a14:useLocalDpi xmlns="" xmlns:a14="http://schemas.microsoft.com/office/drawing/2010/main" val="0"/>
               </a:ext>
             </a:extLst>
           </a:blip>
@@ -12280,7 +12582,7 @@
           <a:noFill/>
           <a:extLst>
             <a:ext uri="{909E8E84-426E-40DD-AFC4-6F175D3DCCD1}">
-              <a14:hiddenFill xmlns:a14="http://schemas.microsoft.com/office/drawing/2010/main" xmlns="">
+              <a14:hiddenFill xmlns="" xmlns:a14="http://schemas.microsoft.com/office/drawing/2010/main">
                 <a:solidFill>
                   <a:srgbClr val="FFFFFF"/>
                 </a:solidFill>
@@ -12292,7 +12594,7 @@
     </p:spTree>
     <p:extLst>
       <p:ext uri="{BB962C8B-B14F-4D97-AF65-F5344CB8AC3E}">
-        <p14:creationId xmlns:p14="http://schemas.microsoft.com/office/powerpoint/2010/main" xmlns="" val="2708678656"/>
+        <p14:creationId xmlns="" xmlns:p14="http://schemas.microsoft.com/office/powerpoint/2010/main" val="2708678656"/>
       </p:ext>
     </p:extLst>
   </p:cSld>
@@ -12670,7 +12972,7 @@
           <a:blip r:embed="rId2" cstate="print">
             <a:extLst>
               <a:ext uri="{28A0092B-C50C-407E-A947-70E740481C1C}">
-                <a14:useLocalDpi xmlns="" xmlns:a14="http://schemas.microsoft.com/office/drawing/2010/main" val="0"/>
+                <a14:useLocalDpi xmlns:a14="http://schemas.microsoft.com/office/drawing/2010/main" xmlns="" val="0"/>
               </a:ext>
             </a:extLst>
           </a:blip>
@@ -12700,7 +13002,7 @@
           <a:blip r:embed="rId3" cstate="print">
             <a:extLst>
               <a:ext uri="{28A0092B-C50C-407E-A947-70E740481C1C}">
-                <a14:useLocalDpi xmlns="" xmlns:a14="http://schemas.microsoft.com/office/drawing/2010/main" val="0"/>
+                <a14:useLocalDpi xmlns:a14="http://schemas.microsoft.com/office/drawing/2010/main" xmlns="" val="0"/>
               </a:ext>
             </a:extLst>
           </a:blip>
@@ -12730,7 +13032,7 @@
           <a:blip r:embed="rId4" cstate="print">
             <a:extLst>
               <a:ext uri="{28A0092B-C50C-407E-A947-70E740481C1C}">
-                <a14:useLocalDpi xmlns="" xmlns:a14="http://schemas.microsoft.com/office/drawing/2010/main" val="0"/>
+                <a14:useLocalDpi xmlns:a14="http://schemas.microsoft.com/office/drawing/2010/main" xmlns="" val="0"/>
               </a:ext>
             </a:extLst>
           </a:blip>
@@ -12760,7 +13062,7 @@
           <a:blip r:embed="rId5" cstate="print">
             <a:extLst>
               <a:ext uri="{28A0092B-C50C-407E-A947-70E740481C1C}">
-                <a14:useLocalDpi xmlns="" xmlns:a14="http://schemas.microsoft.com/office/drawing/2010/main" val="0"/>
+                <a14:useLocalDpi xmlns:a14="http://schemas.microsoft.com/office/drawing/2010/main" xmlns="" val="0"/>
               </a:ext>
             </a:extLst>
           </a:blip>
@@ -12781,7 +13083,7 @@
     </p:spTree>
     <p:extLst>
       <p:ext uri="{BB962C8B-B14F-4D97-AF65-F5344CB8AC3E}">
-        <p14:creationId xmlns="" xmlns:p14="http://schemas.microsoft.com/office/powerpoint/2010/main" val="1088448615"/>
+        <p14:creationId xmlns:p14="http://schemas.microsoft.com/office/powerpoint/2010/main" xmlns="" val="1088448615"/>
       </p:ext>
     </p:extLst>
   </p:cSld>
@@ -12852,7 +13154,7 @@
     </p:spTree>
     <p:extLst>
       <p:ext uri="{BB962C8B-B14F-4D97-AF65-F5344CB8AC3E}">
-        <p14:creationId xmlns:p14="http://schemas.microsoft.com/office/powerpoint/2010/main" xmlns="" val="2865657727"/>
+        <p14:creationId xmlns="" xmlns:p14="http://schemas.microsoft.com/office/powerpoint/2010/main" val="2865657727"/>
       </p:ext>
     </p:extLst>
   </p:cSld>
@@ -13202,7 +13504,7 @@
           <a:blip r:embed="rId2" cstate="print">
             <a:extLst>
               <a:ext uri="{28A0092B-C50C-407E-A947-70E740481C1C}">
-                <a14:useLocalDpi xmlns:a14="http://schemas.microsoft.com/office/drawing/2010/main" xmlns="" val="0"/>
+                <a14:useLocalDpi xmlns="" xmlns:a14="http://schemas.microsoft.com/office/drawing/2010/main" val="0"/>
               </a:ext>
             </a:extLst>
           </a:blip>
@@ -13222,7 +13524,7 @@
           <a:noFill/>
           <a:extLst>
             <a:ext uri="{909E8E84-426E-40DD-AFC4-6F175D3DCCD1}">
-              <a14:hiddenFill xmlns:a14="http://schemas.microsoft.com/office/drawing/2010/main" xmlns="">
+              <a14:hiddenFill xmlns="" xmlns:a14="http://schemas.microsoft.com/office/drawing/2010/main">
                 <a:solidFill>
                   <a:srgbClr val="FFFFFF"/>
                 </a:solidFill>
@@ -13409,7 +13711,7 @@
     </p:spTree>
     <p:extLst>
       <p:ext uri="{BB962C8B-B14F-4D97-AF65-F5344CB8AC3E}">
-        <p14:creationId xmlns:p14="http://schemas.microsoft.com/office/powerpoint/2010/main" xmlns="" val="1421053857"/>
+        <p14:creationId xmlns="" xmlns:p14="http://schemas.microsoft.com/office/powerpoint/2010/main" val="1421053857"/>
       </p:ext>
     </p:extLst>
   </p:cSld>
@@ -13732,7 +14034,7 @@
           <a:blip r:embed="rId2" cstate="print">
             <a:extLst>
               <a:ext uri="{28A0092B-C50C-407E-A947-70E740481C1C}">
-                <a14:useLocalDpi xmlns:a14="http://schemas.microsoft.com/office/drawing/2010/main" xmlns="" val="0"/>
+                <a14:useLocalDpi xmlns="" xmlns:a14="http://schemas.microsoft.com/office/drawing/2010/main" val="0"/>
               </a:ext>
             </a:extLst>
           </a:blip>
@@ -13753,7 +14055,7 @@
     </p:spTree>
     <p:extLst>
       <p:ext uri="{BB962C8B-B14F-4D97-AF65-F5344CB8AC3E}">
-        <p14:creationId xmlns:p14="http://schemas.microsoft.com/office/powerpoint/2010/main" xmlns="" val="966444375"/>
+        <p14:creationId xmlns="" xmlns:p14="http://schemas.microsoft.com/office/powerpoint/2010/main" val="966444375"/>
       </p:ext>
     </p:extLst>
   </p:cSld>
@@ -14084,7 +14386,7 @@
     </p:spTree>
     <p:extLst>
       <p:ext uri="{BB962C8B-B14F-4D97-AF65-F5344CB8AC3E}">
-        <p14:creationId xmlns:p14="http://schemas.microsoft.com/office/powerpoint/2010/main" xmlns="" val="529095658"/>
+        <p14:creationId xmlns="" xmlns:p14="http://schemas.microsoft.com/office/powerpoint/2010/main" val="529095658"/>
       </p:ext>
     </p:extLst>
   </p:cSld>
@@ -14313,7 +14615,7 @@
           <a:blip r:embed="rId2" cstate="print">
             <a:extLst>
               <a:ext uri="{28A0092B-C50C-407E-A947-70E740481C1C}">
-                <a14:useLocalDpi xmlns="" xmlns:a14="http://schemas.microsoft.com/office/drawing/2010/main" xmlns:lc="http://schemas.openxmlformats.org/drawingml/2006/lockedCanvas" val="0"/>
+                <a14:useLocalDpi xmlns:lc="http://schemas.openxmlformats.org/drawingml/2006/lockedCanvas" xmlns:a14="http://schemas.microsoft.com/office/drawing/2010/main" xmlns="" val="0"/>
               </a:ext>
             </a:extLst>
           </a:blip>
@@ -14334,7 +14636,7 @@
     </p:spTree>
     <p:extLst>
       <p:ext uri="{BB962C8B-B14F-4D97-AF65-F5344CB8AC3E}">
-        <p14:creationId xmlns:p14="http://schemas.microsoft.com/office/powerpoint/2010/main" xmlns="" val="2537338845"/>
+        <p14:creationId xmlns="" xmlns:p14="http://schemas.microsoft.com/office/powerpoint/2010/main" val="2537338845"/>
       </p:ext>
     </p:extLst>
   </p:cSld>
@@ -14528,7 +14830,7 @@
           <a:blip r:embed="rId2" cstate="print">
             <a:extLst>
               <a:ext uri="{28A0092B-C50C-407E-A947-70E740481C1C}">
-                <a14:useLocalDpi xmlns:a14="http://schemas.microsoft.com/office/drawing/2010/main" xmlns="" val="0"/>
+                <a14:useLocalDpi xmlns="" xmlns:a14="http://schemas.microsoft.com/office/drawing/2010/main" val="0"/>
               </a:ext>
             </a:extLst>
           </a:blip>
@@ -14584,7 +14886,7 @@
     </p:spTree>
     <p:extLst>
       <p:ext uri="{BB962C8B-B14F-4D97-AF65-F5344CB8AC3E}">
-        <p14:creationId xmlns:p14="http://schemas.microsoft.com/office/powerpoint/2010/main" xmlns="" val="422123805"/>
+        <p14:creationId xmlns="" xmlns:p14="http://schemas.microsoft.com/office/powerpoint/2010/main" val="422123805"/>
       </p:ext>
     </p:extLst>
   </p:cSld>
@@ -14703,7 +15005,7 @@
           <a:blip r:embed="rId2" cstate="print">
             <a:extLst>
               <a:ext uri="{28A0092B-C50C-407E-A947-70E740481C1C}">
-                <a14:useLocalDpi xmlns:a14="http://schemas.microsoft.com/office/drawing/2010/main" xmlns="" val="0"/>
+                <a14:useLocalDpi xmlns="" xmlns:a14="http://schemas.microsoft.com/office/drawing/2010/main" val="0"/>
               </a:ext>
             </a:extLst>
           </a:blip>
@@ -14758,7 +15060,7 @@
     </p:spTree>
     <p:extLst>
       <p:ext uri="{BB962C8B-B14F-4D97-AF65-F5344CB8AC3E}">
-        <p14:creationId xmlns:p14="http://schemas.microsoft.com/office/powerpoint/2010/main" xmlns="" val="247169405"/>
+        <p14:creationId xmlns="" xmlns:p14="http://schemas.microsoft.com/office/powerpoint/2010/main" val="247169405"/>
       </p:ext>
     </p:extLst>
   </p:cSld>
@@ -14846,7 +15148,7 @@
           <a:blip r:embed="rId2" cstate="print">
             <a:extLst>
               <a:ext uri="{28A0092B-C50C-407E-A947-70E740481C1C}">
-                <a14:useLocalDpi xmlns:a14="http://schemas.microsoft.com/office/drawing/2010/main" xmlns="" val="0"/>
+                <a14:useLocalDpi xmlns="" xmlns:a14="http://schemas.microsoft.com/office/drawing/2010/main" val="0"/>
               </a:ext>
             </a:extLst>
           </a:blip>
@@ -14902,7 +15204,7 @@
     </p:spTree>
     <p:extLst>
       <p:ext uri="{BB962C8B-B14F-4D97-AF65-F5344CB8AC3E}">
-        <p14:creationId xmlns:p14="http://schemas.microsoft.com/office/powerpoint/2010/main" xmlns="" val="1376204328"/>
+        <p14:creationId xmlns="" xmlns:p14="http://schemas.microsoft.com/office/powerpoint/2010/main" val="1376204328"/>
       </p:ext>
     </p:extLst>
   </p:cSld>
@@ -14990,7 +15292,7 @@
           <a:blip r:embed="rId2" cstate="print">
             <a:extLst>
               <a:ext uri="{28A0092B-C50C-407E-A947-70E740481C1C}">
-                <a14:useLocalDpi xmlns:a14="http://schemas.microsoft.com/office/drawing/2010/main" xmlns="" val="0"/>
+                <a14:useLocalDpi xmlns="" xmlns:a14="http://schemas.microsoft.com/office/drawing/2010/main" val="0"/>
               </a:ext>
             </a:extLst>
           </a:blip>
@@ -15049,7 +15351,7 @@
     </p:spTree>
     <p:extLst>
       <p:ext uri="{BB962C8B-B14F-4D97-AF65-F5344CB8AC3E}">
-        <p14:creationId xmlns:p14="http://schemas.microsoft.com/office/powerpoint/2010/main" xmlns="" val="1545582615"/>
+        <p14:creationId xmlns="" xmlns:p14="http://schemas.microsoft.com/office/powerpoint/2010/main" val="1545582615"/>
       </p:ext>
     </p:extLst>
   </p:cSld>
@@ -15285,7 +15587,7 @@
           <a:blip r:embed="rId2" cstate="print">
             <a:extLst>
               <a:ext uri="{28A0092B-C50C-407E-A947-70E740481C1C}">
-                <a14:useLocalDpi xmlns="" xmlns:a14="http://schemas.microsoft.com/office/drawing/2010/main" val="0"/>
+                <a14:useLocalDpi xmlns:a14="http://schemas.microsoft.com/office/drawing/2010/main" xmlns="" val="0"/>
               </a:ext>
             </a:extLst>
           </a:blip>
@@ -15309,14 +15611,14 @@
           <a:effectLst/>
           <a:extLst>
             <a:ext uri="{909E8E84-426E-40DD-AFC4-6F175D3DCCD1}">
-              <a14:hiddenFill xmlns="" xmlns:a14="http://schemas.microsoft.com/office/drawing/2010/main">
+              <a14:hiddenFill xmlns:a14="http://schemas.microsoft.com/office/drawing/2010/main" xmlns="">
                 <a:solidFill>
                   <a:schemeClr val="accent1"/>
                 </a:solidFill>
               </a14:hiddenFill>
             </a:ext>
             <a:ext uri="{91240B29-F687-4F45-9708-019B960494DF}">
-              <a14:hiddenLine xmlns="" xmlns:a14="http://schemas.microsoft.com/office/drawing/2010/main" w="9525">
+              <a14:hiddenLine xmlns:a14="http://schemas.microsoft.com/office/drawing/2010/main" xmlns="" w="9525">
                 <a:solidFill>
                   <a:schemeClr val="tx1"/>
                 </a:solidFill>
@@ -15326,7 +15628,7 @@
               </a14:hiddenLine>
             </a:ext>
             <a:ext uri="{AF507438-7753-43E0-B8FC-AC1667EBCBE1}">
-              <a14:hiddenEffects xmlns="" xmlns:a14="http://schemas.microsoft.com/office/drawing/2010/main">
+              <a14:hiddenEffects xmlns:a14="http://schemas.microsoft.com/office/drawing/2010/main" xmlns="">
                 <a:effectLst>
                   <a:outerShdw dist="35921" dir="2700000" algn="ctr" rotWithShape="0">
                     <a:schemeClr val="bg2"/>
@@ -15340,7 +15642,7 @@
     </p:spTree>
     <p:extLst>
       <p:ext uri="{BB962C8B-B14F-4D97-AF65-F5344CB8AC3E}">
-        <p14:creationId xmlns="" xmlns:p14="http://schemas.microsoft.com/office/powerpoint/2010/main" val="155874689"/>
+        <p14:creationId xmlns:p14="http://schemas.microsoft.com/office/powerpoint/2010/main" xmlns="" val="155874689"/>
       </p:ext>
     </p:extLst>
   </p:cSld>
@@ -15348,7 +15650,7 @@
     <a:masterClrMapping/>
   </p:clrMapOvr>
   <mc:AlternateContent xmlns:mc="http://schemas.openxmlformats.org/markup-compatibility/2006">
-    <mc:Choice xmlns="" xmlns:p14="http://schemas.microsoft.com/office/powerpoint/2010/main" Requires="p14">
+    <mc:Choice xmlns:p14="http://schemas.microsoft.com/office/powerpoint/2010/main" xmlns="" Requires="p14">
       <p:transition spd="slow" p14:dur="2000"/>
     </mc:Choice>
     <mc:Fallback>
@@ -15433,7 +15735,7 @@
           <a:blip r:embed="rId2" cstate="print">
             <a:extLst>
               <a:ext uri="{28A0092B-C50C-407E-A947-70E740481C1C}">
-                <a14:useLocalDpi xmlns:a14="http://schemas.microsoft.com/office/drawing/2010/main" xmlns="" val="0"/>
+                <a14:useLocalDpi xmlns="" xmlns:a14="http://schemas.microsoft.com/office/drawing/2010/main" val="0"/>
               </a:ext>
             </a:extLst>
           </a:blip>
@@ -15454,7 +15756,7 @@
     </p:spTree>
     <p:extLst>
       <p:ext uri="{BB962C8B-B14F-4D97-AF65-F5344CB8AC3E}">
-        <p14:creationId xmlns:p14="http://schemas.microsoft.com/office/powerpoint/2010/main" xmlns="" val="1296864160"/>
+        <p14:creationId xmlns="" xmlns:p14="http://schemas.microsoft.com/office/powerpoint/2010/main" val="1296864160"/>
       </p:ext>
     </p:extLst>
   </p:cSld>
@@ -15535,7 +15837,7 @@
           <a:blip r:embed="rId2" cstate="print">
             <a:extLst>
               <a:ext uri="{28A0092B-C50C-407E-A947-70E740481C1C}">
-                <a14:useLocalDpi xmlns:a14="http://schemas.microsoft.com/office/drawing/2010/main" xmlns="" val="0"/>
+                <a14:useLocalDpi xmlns="" xmlns:a14="http://schemas.microsoft.com/office/drawing/2010/main" val="0"/>
               </a:ext>
             </a:extLst>
           </a:blip>
@@ -15590,7 +15892,7 @@
     </p:spTree>
     <p:extLst>
       <p:ext uri="{BB962C8B-B14F-4D97-AF65-F5344CB8AC3E}">
-        <p14:creationId xmlns:p14="http://schemas.microsoft.com/office/powerpoint/2010/main" xmlns="" val="518928479"/>
+        <p14:creationId xmlns="" xmlns:p14="http://schemas.microsoft.com/office/powerpoint/2010/main" val="518928479"/>
       </p:ext>
     </p:extLst>
   </p:cSld>
@@ -15673,7 +15975,7 @@
           <a:blip r:embed="rId2" cstate="print">
             <a:extLst>
               <a:ext uri="{28A0092B-C50C-407E-A947-70E740481C1C}">
-                <a14:useLocalDpi xmlns:a14="http://schemas.microsoft.com/office/drawing/2010/main" xmlns="" val="0"/>
+                <a14:useLocalDpi xmlns="" xmlns:a14="http://schemas.microsoft.com/office/drawing/2010/main" val="0"/>
               </a:ext>
             </a:extLst>
           </a:blip>
@@ -15694,7 +15996,7 @@
     </p:spTree>
     <p:extLst>
       <p:ext uri="{BB962C8B-B14F-4D97-AF65-F5344CB8AC3E}">
-        <p14:creationId xmlns:p14="http://schemas.microsoft.com/office/powerpoint/2010/main" xmlns="" val="4136420094"/>
+        <p14:creationId xmlns="" xmlns:p14="http://schemas.microsoft.com/office/powerpoint/2010/main" val="4136420094"/>
       </p:ext>
     </p:extLst>
   </p:cSld>
@@ -15779,7 +16081,7 @@
           <a:blip r:embed="rId2" cstate="print">
             <a:extLst>
               <a:ext uri="{28A0092B-C50C-407E-A947-70E740481C1C}">
-                <a14:useLocalDpi xmlns:a14="http://schemas.microsoft.com/office/drawing/2010/main" xmlns="" val="0"/>
+                <a14:useLocalDpi xmlns="" xmlns:a14="http://schemas.microsoft.com/office/drawing/2010/main" val="0"/>
               </a:ext>
             </a:extLst>
           </a:blip>
@@ -15831,7 +16133,7 @@
     </p:spTree>
     <p:extLst>
       <p:ext uri="{BB962C8B-B14F-4D97-AF65-F5344CB8AC3E}">
-        <p14:creationId xmlns:p14="http://schemas.microsoft.com/office/powerpoint/2010/main" xmlns="" val="2535709406"/>
+        <p14:creationId xmlns="" xmlns:p14="http://schemas.microsoft.com/office/powerpoint/2010/main" val="2535709406"/>
       </p:ext>
     </p:extLst>
   </p:cSld>
@@ -16033,7 +16335,7 @@
     </p:spTree>
     <p:extLst>
       <p:ext uri="{BB962C8B-B14F-4D97-AF65-F5344CB8AC3E}">
-        <p14:creationId xmlns:p14="http://schemas.microsoft.com/office/powerpoint/2010/main" xmlns="" val="2176004432"/>
+        <p14:creationId xmlns="" xmlns:p14="http://schemas.microsoft.com/office/powerpoint/2010/main" val="2176004432"/>
       </p:ext>
     </p:extLst>
   </p:cSld>
@@ -16333,7 +16635,7 @@
     </p:spTree>
     <p:extLst>
       <p:ext uri="{BB962C8B-B14F-4D97-AF65-F5344CB8AC3E}">
-        <p14:creationId xmlns:p14="http://schemas.microsoft.com/office/powerpoint/2010/main" xmlns="" val="1143488046"/>
+        <p14:creationId xmlns="" xmlns:p14="http://schemas.microsoft.com/office/powerpoint/2010/main" val="1143488046"/>
       </p:ext>
     </p:extLst>
   </p:cSld>
@@ -16784,7 +17086,7 @@
     </p:spTree>
     <p:extLst>
       <p:ext uri="{BB962C8B-B14F-4D97-AF65-F5344CB8AC3E}">
-        <p14:creationId xmlns:p14="http://schemas.microsoft.com/office/powerpoint/2010/main" xmlns="" val="957313322"/>
+        <p14:creationId xmlns="" xmlns:p14="http://schemas.microsoft.com/office/powerpoint/2010/main" val="957313322"/>
       </p:ext>
     </p:extLst>
   </p:cSld>
@@ -17334,7 +17636,7 @@
     </p:spTree>
     <p:extLst>
       <p:ext uri="{BB962C8B-B14F-4D97-AF65-F5344CB8AC3E}">
-        <p14:creationId xmlns="" xmlns:p14="http://schemas.microsoft.com/office/powerpoint/2010/main" val="155874689"/>
+        <p14:creationId xmlns:p14="http://schemas.microsoft.com/office/powerpoint/2010/main" xmlns="" val="155874689"/>
       </p:ext>
     </p:extLst>
   </p:cSld>
@@ -17342,7 +17644,7 @@
     <a:masterClrMapping/>
   </p:clrMapOvr>
   <mc:AlternateContent xmlns:mc="http://schemas.openxmlformats.org/markup-compatibility/2006">
-    <mc:Choice xmlns="" xmlns:p14="http://schemas.microsoft.com/office/powerpoint/2010/main" Requires="p14">
+    <mc:Choice xmlns:p14="http://schemas.microsoft.com/office/powerpoint/2010/main" xmlns="" Requires="p14">
       <p:transition spd="slow" p14:dur="2000"/>
     </mc:Choice>
     <mc:Fallback>
@@ -17751,7 +18053,7 @@
     </p:spTree>
     <p:extLst>
       <p:ext uri="{BB962C8B-B14F-4D97-AF65-F5344CB8AC3E}">
-        <p14:creationId xmlns="" xmlns:p14="http://schemas.microsoft.com/office/powerpoint/2010/main" val="155874689"/>
+        <p14:creationId xmlns:p14="http://schemas.microsoft.com/office/powerpoint/2010/main" xmlns="" val="155874689"/>
       </p:ext>
     </p:extLst>
   </p:cSld>
@@ -17759,7 +18061,7 @@
     <a:masterClrMapping/>
   </p:clrMapOvr>
   <mc:AlternateContent xmlns:mc="http://schemas.openxmlformats.org/markup-compatibility/2006">
-    <mc:Choice xmlns="" xmlns:p14="http://schemas.microsoft.com/office/powerpoint/2010/main" Requires="p14">
+    <mc:Choice xmlns:p14="http://schemas.microsoft.com/office/powerpoint/2010/main" xmlns="" Requires="p14">
       <p:transition spd="slow" p14:dur="2000"/>
     </mc:Choice>
     <mc:Fallback>
@@ -18032,7 +18334,7 @@
           <a:blip r:embed="rId2" cstate="print">
             <a:extLst>
               <a:ext uri="{28A0092B-C50C-407E-A947-70E740481C1C}">
-                <a14:useLocalDpi xmlns="" xmlns:a14="http://schemas.microsoft.com/office/drawing/2010/main" val="0"/>
+                <a14:useLocalDpi xmlns:a14="http://schemas.microsoft.com/office/drawing/2010/main" xmlns="" val="0"/>
               </a:ext>
             </a:extLst>
           </a:blip>
@@ -18101,7 +18403,7 @@
     </p:spTree>
     <p:extLst>
       <p:ext uri="{BB962C8B-B14F-4D97-AF65-F5344CB8AC3E}">
-        <p14:creationId xmlns="" xmlns:p14="http://schemas.microsoft.com/office/powerpoint/2010/main" val="2658739501"/>
+        <p14:creationId xmlns:p14="http://schemas.microsoft.com/office/powerpoint/2010/main" xmlns="" val="2658739501"/>
       </p:ext>
     </p:extLst>
   </p:cSld>
@@ -18440,7 +18742,7 @@
     </p:spTree>
     <p:extLst>
       <p:ext uri="{BB962C8B-B14F-4D97-AF65-F5344CB8AC3E}">
-        <p14:creationId xmlns="" xmlns:p14="http://schemas.microsoft.com/office/powerpoint/2010/main" val="155874689"/>
+        <p14:creationId xmlns:p14="http://schemas.microsoft.com/office/powerpoint/2010/main" xmlns="" val="155874689"/>
       </p:ext>
     </p:extLst>
   </p:cSld>
@@ -18448,7 +18750,7 @@
     <a:masterClrMapping/>
   </p:clrMapOvr>
   <mc:AlternateContent xmlns:mc="http://schemas.openxmlformats.org/markup-compatibility/2006">
-    <mc:Choice xmlns="" xmlns:p14="http://schemas.microsoft.com/office/powerpoint/2010/main" Requires="p14">
+    <mc:Choice xmlns:p14="http://schemas.microsoft.com/office/powerpoint/2010/main" xmlns="" Requires="p14">
       <p:transition spd="slow" p14:dur="2000"/>
     </mc:Choice>
     <mc:Fallback>
@@ -18816,7 +19118,7 @@
     </p:spTree>
     <p:extLst>
       <p:ext uri="{BB962C8B-B14F-4D97-AF65-F5344CB8AC3E}">
-        <p14:creationId xmlns="" xmlns:p14="http://schemas.microsoft.com/office/powerpoint/2010/main" val="155874689"/>
+        <p14:creationId xmlns:p14="http://schemas.microsoft.com/office/powerpoint/2010/main" xmlns="" val="155874689"/>
       </p:ext>
     </p:extLst>
   </p:cSld>
@@ -18824,7 +19126,7 @@
     <a:masterClrMapping/>
   </p:clrMapOvr>
   <mc:AlternateContent xmlns:mc="http://schemas.openxmlformats.org/markup-compatibility/2006">
-    <mc:Choice xmlns="" xmlns:p14="http://schemas.microsoft.com/office/powerpoint/2010/main" Requires="p14">
+    <mc:Choice xmlns:p14="http://schemas.microsoft.com/office/powerpoint/2010/main" xmlns="" Requires="p14">
       <p:transition spd="slow" p14:dur="2000"/>
     </mc:Choice>
     <mc:Fallback>
@@ -19058,7 +19360,7 @@
     </p:spTree>
     <p:extLst>
       <p:ext uri="{BB962C8B-B14F-4D97-AF65-F5344CB8AC3E}">
-        <p14:creationId xmlns="" xmlns:p14="http://schemas.microsoft.com/office/powerpoint/2010/main" val="155874689"/>
+        <p14:creationId xmlns:p14="http://schemas.microsoft.com/office/powerpoint/2010/main" xmlns="" val="155874689"/>
       </p:ext>
     </p:extLst>
   </p:cSld>
@@ -21066,7 +21368,7 @@
     </p:spTree>
     <p:extLst>
       <p:ext uri="{BB962C8B-B14F-4D97-AF65-F5344CB8AC3E}">
-        <p14:creationId xmlns="" xmlns:p14="http://schemas.microsoft.com/office/powerpoint/2010/main" val="155874689"/>
+        <p14:creationId xmlns:p14="http://schemas.microsoft.com/office/powerpoint/2010/main" xmlns="" val="155874689"/>
       </p:ext>
     </p:extLst>
   </p:cSld>
@@ -21074,7 +21376,7 @@
     <a:masterClrMapping/>
   </p:clrMapOvr>
   <mc:AlternateContent xmlns:mc="http://schemas.openxmlformats.org/markup-compatibility/2006">
-    <mc:Choice xmlns="" xmlns:p14="http://schemas.microsoft.com/office/powerpoint/2010/main" Requires="p14">
+    <mc:Choice xmlns:p14="http://schemas.microsoft.com/office/powerpoint/2010/main" xmlns="" Requires="p14">
       <p:transition spd="slow" p14:dur="2000"/>
     </mc:Choice>
     <mc:Fallback>
@@ -22163,7 +22465,7 @@
     </p:spTree>
     <p:extLst>
       <p:ext uri="{BB962C8B-B14F-4D97-AF65-F5344CB8AC3E}">
-        <p14:creationId xmlns="" xmlns:p14="http://schemas.microsoft.com/office/powerpoint/2010/main" val="155874689"/>
+        <p14:creationId xmlns:p14="http://schemas.microsoft.com/office/powerpoint/2010/main" xmlns="" val="155874689"/>
       </p:ext>
     </p:extLst>
   </p:cSld>
@@ -22171,7 +22473,7 @@
     <a:masterClrMapping/>
   </p:clrMapOvr>
   <mc:AlternateContent xmlns:mc="http://schemas.openxmlformats.org/markup-compatibility/2006">
-    <mc:Choice xmlns="" xmlns:p14="http://schemas.microsoft.com/office/powerpoint/2010/main" Requires="p14">
+    <mc:Choice xmlns:p14="http://schemas.microsoft.com/office/powerpoint/2010/main" xmlns="" Requires="p14">
       <p:transition spd="slow" p14:dur="2000"/>
     </mc:Choice>
     <mc:Fallback>
@@ -23703,7 +24005,7 @@
     </p:spTree>
     <p:extLst>
       <p:ext uri="{BB962C8B-B14F-4D97-AF65-F5344CB8AC3E}">
-        <p14:creationId xmlns="" xmlns:p14="http://schemas.microsoft.com/office/powerpoint/2010/main" val="155874689"/>
+        <p14:creationId xmlns:p14="http://schemas.microsoft.com/office/powerpoint/2010/main" xmlns="" val="155874689"/>
       </p:ext>
     </p:extLst>
   </p:cSld>
@@ -23711,7 +24013,7 @@
     <a:masterClrMapping/>
   </p:clrMapOvr>
   <mc:AlternateContent xmlns:mc="http://schemas.openxmlformats.org/markup-compatibility/2006">
-    <mc:Choice xmlns="" xmlns:p14="http://schemas.microsoft.com/office/powerpoint/2010/main" Requires="p14">
+    <mc:Choice xmlns:p14="http://schemas.microsoft.com/office/powerpoint/2010/main" xmlns="" Requires="p14">
       <p:transition spd="slow" p14:dur="2000"/>
     </mc:Choice>
     <mc:Fallback>
@@ -24773,7 +25075,7 @@
     </p:spTree>
     <p:extLst>
       <p:ext uri="{BB962C8B-B14F-4D97-AF65-F5344CB8AC3E}">
-        <p14:creationId xmlns="" xmlns:p14="http://schemas.microsoft.com/office/powerpoint/2010/main" val="155874689"/>
+        <p14:creationId xmlns:p14="http://schemas.microsoft.com/office/powerpoint/2010/main" xmlns="" val="155874689"/>
       </p:ext>
     </p:extLst>
   </p:cSld>
@@ -24781,7 +25083,7 @@
     <a:masterClrMapping/>
   </p:clrMapOvr>
   <mc:AlternateContent xmlns:mc="http://schemas.openxmlformats.org/markup-compatibility/2006">
-    <mc:Choice xmlns="" xmlns:p14="http://schemas.microsoft.com/office/powerpoint/2010/main" Requires="p14">
+    <mc:Choice xmlns:p14="http://schemas.microsoft.com/office/powerpoint/2010/main" xmlns="" Requires="p14">
       <p:transition spd="slow" p14:dur="2000"/>
     </mc:Choice>
     <mc:Fallback>
@@ -25480,7 +25782,7 @@
           <a:blip r:embed="rId2" cstate="print">
             <a:extLst>
               <a:ext uri="{28A0092B-C50C-407E-A947-70E740481C1C}">
-                <a14:useLocalDpi xmlns="" xmlns:a14="http://schemas.microsoft.com/office/drawing/2010/main" val="0"/>
+                <a14:useLocalDpi xmlns:a14="http://schemas.microsoft.com/office/drawing/2010/main" xmlns="" val="0"/>
               </a:ext>
             </a:extLst>
           </a:blip>
@@ -25501,7 +25803,7 @@
     </p:spTree>
     <p:extLst>
       <p:ext uri="{BB962C8B-B14F-4D97-AF65-F5344CB8AC3E}">
-        <p14:creationId xmlns="" xmlns:p14="http://schemas.microsoft.com/office/powerpoint/2010/main" val="155874689"/>
+        <p14:creationId xmlns:p14="http://schemas.microsoft.com/office/powerpoint/2010/main" xmlns="" val="155874689"/>
       </p:ext>
     </p:extLst>
   </p:cSld>
@@ -25687,7 +25989,7 @@
     </p:spTree>
     <p:extLst>
       <p:ext uri="{BB962C8B-B14F-4D97-AF65-F5344CB8AC3E}">
-        <p14:creationId xmlns:p14="http://schemas.microsoft.com/office/powerpoint/2010/main" xmlns="" val="2865657727"/>
+        <p14:creationId xmlns="" xmlns:p14="http://schemas.microsoft.com/office/powerpoint/2010/main" val="2865657727"/>
       </p:ext>
     </p:extLst>
   </p:cSld>
@@ -25874,7 +26176,7 @@
     </p:spTree>
     <p:extLst>
       <p:ext uri="{BB962C8B-B14F-4D97-AF65-F5344CB8AC3E}">
-        <p14:creationId xmlns="" xmlns:p14="http://schemas.microsoft.com/office/powerpoint/2010/main" val="335055555"/>
+        <p14:creationId xmlns:p14="http://schemas.microsoft.com/office/powerpoint/2010/main" xmlns="" val="335055555"/>
       </p:ext>
     </p:extLst>
   </p:cSld>
@@ -26077,7 +26379,7 @@
           <a:blip r:embed="rId2" cstate="print">
             <a:extLst>
               <a:ext uri="{28A0092B-C50C-407E-A947-70E740481C1C}">
-                <a14:useLocalDpi xmlns="" xmlns:a14="http://schemas.microsoft.com/office/drawing/2010/main" val="0"/>
+                <a14:useLocalDpi xmlns:a14="http://schemas.microsoft.com/office/drawing/2010/main" xmlns="" val="0"/>
               </a:ext>
             </a:extLst>
           </a:blip>
@@ -26098,7 +26400,7 @@
     </p:spTree>
     <p:extLst>
       <p:ext uri="{BB962C8B-B14F-4D97-AF65-F5344CB8AC3E}">
-        <p14:creationId xmlns="" xmlns:p14="http://schemas.microsoft.com/office/powerpoint/2010/main" val="2479304105"/>
+        <p14:creationId xmlns:p14="http://schemas.microsoft.com/office/powerpoint/2010/main" xmlns="" val="2479304105"/>
       </p:ext>
     </p:extLst>
   </p:cSld>
@@ -26349,7 +26651,7 @@
           <a:blip r:embed="rId2" cstate="print">
             <a:extLst>
               <a:ext uri="{28A0092B-C50C-407E-A947-70E740481C1C}">
-                <a14:useLocalDpi xmlns="" xmlns:a14="http://schemas.microsoft.com/office/drawing/2010/main" val="0"/>
+                <a14:useLocalDpi xmlns:a14="http://schemas.microsoft.com/office/drawing/2010/main" xmlns="" val="0"/>
               </a:ext>
             </a:extLst>
           </a:blip>
@@ -26370,7 +26672,7 @@
     </p:spTree>
     <p:extLst>
       <p:ext uri="{BB962C8B-B14F-4D97-AF65-F5344CB8AC3E}">
-        <p14:creationId xmlns="" xmlns:p14="http://schemas.microsoft.com/office/powerpoint/2010/main" val="2034037302"/>
+        <p14:creationId xmlns:p14="http://schemas.microsoft.com/office/powerpoint/2010/main" xmlns="" val="2034037302"/>
       </p:ext>
     </p:extLst>
   </p:cSld>
@@ -26621,7 +26923,7 @@
           <a:blip r:embed="rId2" cstate="print">
             <a:extLst>
               <a:ext uri="{28A0092B-C50C-407E-A947-70E740481C1C}">
-                <a14:useLocalDpi xmlns="" xmlns:a14="http://schemas.microsoft.com/office/drawing/2010/main" val="0"/>
+                <a14:useLocalDpi xmlns:a14="http://schemas.microsoft.com/office/drawing/2010/main" xmlns="" val="0"/>
               </a:ext>
             </a:extLst>
           </a:blip>
@@ -26642,7 +26944,7 @@
     </p:spTree>
     <p:extLst>
       <p:ext uri="{BB962C8B-B14F-4D97-AF65-F5344CB8AC3E}">
-        <p14:creationId xmlns="" xmlns:p14="http://schemas.microsoft.com/office/powerpoint/2010/main" val="505771863"/>
+        <p14:creationId xmlns:p14="http://schemas.microsoft.com/office/powerpoint/2010/main" xmlns="" val="505771863"/>
       </p:ext>
     </p:extLst>
   </p:cSld>
@@ -26944,7 +27246,7 @@
     </p:spTree>
     <p:extLst>
       <p:ext uri="{BB962C8B-B14F-4D97-AF65-F5344CB8AC3E}">
-        <p14:creationId xmlns="" xmlns:p14="http://schemas.microsoft.com/office/powerpoint/2010/main" val="1080303246"/>
+        <p14:creationId xmlns:p14="http://schemas.microsoft.com/office/powerpoint/2010/main" xmlns="" val="1080303246"/>
       </p:ext>
     </p:extLst>
   </p:cSld>
@@ -27075,7 +27377,7 @@
           <a:blip r:embed="rId3" cstate="print">
             <a:extLst>
               <a:ext uri="{28A0092B-C50C-407E-A947-70E740481C1C}">
-                <a14:useLocalDpi xmlns="" xmlns:a14="http://schemas.microsoft.com/office/drawing/2010/main" val="0"/>
+                <a14:useLocalDpi xmlns:a14="http://schemas.microsoft.com/office/drawing/2010/main" xmlns="" val="0"/>
               </a:ext>
             </a:extLst>
           </a:blip>
@@ -27096,7 +27398,7 @@
     </p:spTree>
     <p:extLst>
       <p:ext uri="{BB962C8B-B14F-4D97-AF65-F5344CB8AC3E}">
-        <p14:creationId xmlns="" xmlns:p14="http://schemas.microsoft.com/office/powerpoint/2010/main" val="903072151"/>
+        <p14:creationId xmlns:p14="http://schemas.microsoft.com/office/powerpoint/2010/main" xmlns="" val="903072151"/>
       </p:ext>
     </p:extLst>
   </p:cSld>
@@ -27183,7 +27485,7 @@
           <a:blip r:embed="rId3" cstate="print">
             <a:extLst>
               <a:ext uri="{28A0092B-C50C-407E-A947-70E740481C1C}">
-                <a14:useLocalDpi xmlns="" xmlns:a14="http://schemas.microsoft.com/office/drawing/2010/main" val="0"/>
+                <a14:useLocalDpi xmlns:a14="http://schemas.microsoft.com/office/drawing/2010/main" xmlns="" val="0"/>
               </a:ext>
             </a:extLst>
           </a:blip>
@@ -27331,7 +27633,7 @@
     </p:spTree>
     <p:extLst>
       <p:ext uri="{BB962C8B-B14F-4D97-AF65-F5344CB8AC3E}">
-        <p14:creationId xmlns="" xmlns:p14="http://schemas.microsoft.com/office/powerpoint/2010/main" val="3259527293"/>
+        <p14:creationId xmlns:p14="http://schemas.microsoft.com/office/powerpoint/2010/main" xmlns="" val="3259527293"/>
       </p:ext>
     </p:extLst>
   </p:cSld>
@@ -27609,7 +27911,7 @@
           <a:blip r:embed="rId2" cstate="print">
             <a:extLst>
               <a:ext uri="{28A0092B-C50C-407E-A947-70E740481C1C}">
-                <a14:useLocalDpi xmlns="" xmlns:a14="http://schemas.microsoft.com/office/drawing/2010/main" val="0"/>
+                <a14:useLocalDpi xmlns:a14="http://schemas.microsoft.com/office/drawing/2010/main" xmlns="" val="0"/>
               </a:ext>
             </a:extLst>
           </a:blip>
@@ -27630,7 +27932,7 @@
     </p:spTree>
     <p:extLst>
       <p:ext uri="{BB962C8B-B14F-4D97-AF65-F5344CB8AC3E}">
-        <p14:creationId xmlns="" xmlns:p14="http://schemas.microsoft.com/office/powerpoint/2010/main" val="2526991034"/>
+        <p14:creationId xmlns:p14="http://schemas.microsoft.com/office/powerpoint/2010/main" xmlns="" val="2526991034"/>
       </p:ext>
     </p:extLst>
   </p:cSld>
@@ -27958,7 +28260,7 @@
     </p:spTree>
     <p:extLst>
       <p:ext uri="{BB962C8B-B14F-4D97-AF65-F5344CB8AC3E}">
-        <p14:creationId xmlns="" xmlns:p14="http://schemas.microsoft.com/office/powerpoint/2010/main" val="155874689"/>
+        <p14:creationId xmlns:p14="http://schemas.microsoft.com/office/powerpoint/2010/main" xmlns="" val="155874689"/>
       </p:ext>
     </p:extLst>
   </p:cSld>
@@ -28194,14 +28496,14 @@
       </p:sp>
       <p:pic>
         <p:nvPicPr>
-          <p:cNvPr id="2050" name="Picture 2" descr="C:\Users\Amministratore\Desktop\Lucidi lezioni\Ingegneria del software\at-silo\RAD\Casi d'uso\Atsilo3\Eventi\diagramma eventi.jpg"/>
+          <p:cNvPr id="1026" name="Picture 2" descr="C:\Users\Amministratore\Desktop\diagramma eventi.png"/>
           <p:cNvPicPr>
             <a:picLocks noChangeAspect="1" noChangeArrowheads="1"/>
           </p:cNvPicPr>
           <p:nvPr/>
         </p:nvPicPr>
         <p:blipFill>
-          <a:blip r:embed="rId3" cstate="print"/>
+          <a:blip r:embed="rId3"/>
           <a:srcRect/>
           <a:stretch>
             <a:fillRect/>
@@ -28209,8 +28511,8 @@
         </p:blipFill>
         <p:spPr bwMode="auto">
           <a:xfrm>
-            <a:off x="647404" y="824262"/>
-            <a:ext cx="7353620" cy="6033740"/>
+            <a:off x="714348" y="828657"/>
+            <a:ext cx="7536678" cy="6029343"/>
           </a:xfrm>
           <a:prstGeom prst="rect">
             <a:avLst/>
@@ -28221,7 +28523,7 @@
     </p:spTree>
     <p:extLst>
       <p:ext uri="{BB962C8B-B14F-4D97-AF65-F5344CB8AC3E}">
-        <p14:creationId xmlns="" xmlns:p14="http://schemas.microsoft.com/office/powerpoint/2010/main" val="155874689"/>
+        <p14:creationId xmlns:p14="http://schemas.microsoft.com/office/powerpoint/2010/main" xmlns="" val="155874689"/>
       </p:ext>
     </p:extLst>
   </p:cSld>
@@ -28229,7 +28531,7 @@
     <a:masterClrMapping/>
   </p:clrMapOvr>
   <mc:AlternateContent xmlns:mc="http://schemas.openxmlformats.org/markup-compatibility/2006">
-    <mc:Choice xmlns="" xmlns:p14="http://schemas.microsoft.com/office/powerpoint/2010/main" Requires="p14">
+    <mc:Choice xmlns:p14="http://schemas.microsoft.com/office/powerpoint/2010/main" xmlns="" Requires="p14">
       <p:transition spd="slow" p14:dur="2000"/>
     </mc:Choice>
     <mc:Fallback>
@@ -28415,7 +28717,7 @@
           <a:blip r:embed="rId3" cstate="print">
             <a:extLst>
               <a:ext uri="{28A0092B-C50C-407E-A947-70E740481C1C}">
-                <a14:useLocalDpi xmlns:a14="http://schemas.microsoft.com/office/drawing/2010/main" xmlns="" val="0"/>
+                <a14:useLocalDpi xmlns="" xmlns:a14="http://schemas.microsoft.com/office/drawing/2010/main" val="0"/>
               </a:ext>
             </a:extLst>
           </a:blip>
@@ -28435,7 +28737,7 @@
           <a:noFill/>
           <a:extLst>
             <a:ext uri="{909E8E84-426E-40DD-AFC4-6F175D3DCCD1}">
-              <a14:hiddenFill xmlns:a14="http://schemas.microsoft.com/office/drawing/2010/main" xmlns="">
+              <a14:hiddenFill xmlns="" xmlns:a14="http://schemas.microsoft.com/office/drawing/2010/main">
                 <a:solidFill>
                   <a:srgbClr val="FFFFFF"/>
                 </a:solidFill>
@@ -28447,7 +28749,7 @@
     </p:spTree>
     <p:extLst>
       <p:ext uri="{BB962C8B-B14F-4D97-AF65-F5344CB8AC3E}">
-        <p14:creationId xmlns:p14="http://schemas.microsoft.com/office/powerpoint/2010/main" xmlns="" val="530534880"/>
+        <p14:creationId xmlns="" xmlns:p14="http://schemas.microsoft.com/office/powerpoint/2010/main" val="530534880"/>
       </p:ext>
     </p:extLst>
   </p:cSld>
@@ -28704,7 +29006,7 @@
     </p:spTree>
     <p:extLst>
       <p:ext uri="{BB962C8B-B14F-4D97-AF65-F5344CB8AC3E}">
-        <p14:creationId xmlns="" xmlns:p14="http://schemas.microsoft.com/office/powerpoint/2010/main" val="155874689"/>
+        <p14:creationId xmlns:p14="http://schemas.microsoft.com/office/powerpoint/2010/main" xmlns="" val="155874689"/>
       </p:ext>
     </p:extLst>
   </p:cSld>
@@ -28712,7 +29014,7 @@
     <a:masterClrMapping/>
   </p:clrMapOvr>
   <mc:AlternateContent xmlns:mc="http://schemas.openxmlformats.org/markup-compatibility/2006">
-    <mc:Choice xmlns="" xmlns:p14="http://schemas.microsoft.com/office/powerpoint/2010/main" Requires="p14">
+    <mc:Choice xmlns:p14="http://schemas.microsoft.com/office/powerpoint/2010/main" xmlns="" Requires="p14">
       <p:transition spd="slow" p14:dur="2000"/>
     </mc:Choice>
     <mc:Fallback>
@@ -29219,7 +29521,7 @@
     </p:spTree>
     <p:extLst>
       <p:ext uri="{BB962C8B-B14F-4D97-AF65-F5344CB8AC3E}">
-        <p14:creationId xmlns:p14="http://schemas.microsoft.com/office/powerpoint/2010/main" xmlns="" val="155874689"/>
+        <p14:creationId xmlns="" xmlns:p14="http://schemas.microsoft.com/office/powerpoint/2010/main" val="155874689"/>
       </p:ext>
     </p:extLst>
   </p:cSld>
@@ -29227,7 +29529,7 @@
     <a:masterClrMapping/>
   </p:clrMapOvr>
   <mc:AlternateContent xmlns:mc="http://schemas.openxmlformats.org/markup-compatibility/2006">
-    <mc:Choice xmlns:p14="http://schemas.microsoft.com/office/powerpoint/2010/main" xmlns="" Requires="p14">
+    <mc:Choice xmlns="" xmlns:p14="http://schemas.microsoft.com/office/powerpoint/2010/main" Requires="p14">
       <p:transition spd="slow" p14:dur="2000"/>
     </mc:Choice>
     <mc:Fallback>
@@ -29648,42 +29950,6 @@
           </a:p>
         </p:txBody>
       </p:sp>
-      <p:sp>
-        <p:nvSpPr>
-          <p:cNvPr id="6" name="CasellaDiTesto 5"/>
-          <p:cNvSpPr txBox="1"/>
-          <p:nvPr/>
-        </p:nvSpPr>
-        <p:spPr>
-          <a:xfrm>
-            <a:off x="539552" y="592812"/>
-            <a:ext cx="8142305" cy="1107996"/>
-          </a:xfrm>
-          <a:prstGeom prst="rect">
-            <a:avLst/>
-          </a:prstGeom>
-          <a:noFill/>
-        </p:spPr>
-        <p:txBody>
-          <a:bodyPr wrap="square" rtlCol="0">
-            <a:spAutoFit/>
-          </a:bodyPr>
-          <a:lstStyle/>
-          <a:p>
-            <a:pPr algn="ctr"/>
-            <a:r>
-              <a:rPr lang="it-IT" sz="4800" b="1" dirty="0" smtClean="0"/>
-              <a:t>Gestione Eventi</a:t>
-            </a:r>
-          </a:p>
-          <a:p>
-            <a:pPr algn="ctr"/>
-            <a:endParaRPr lang="it-IT" dirty="0">
-              <a:latin typeface="+mj-lt"/>
-            </a:endParaRPr>
-          </a:p>
-        </p:txBody>
-      </p:sp>
       <p:pic>
         <p:nvPicPr>
           <p:cNvPr id="6146" name="Picture 2" descr="http://www.newnotizie.it/wp-content/uploads/2011/09/omino-stop.png"/>
@@ -29710,10 +29976,64 @@
           <a:noFill/>
         </p:spPr>
       </p:pic>
+      <p:sp>
+        <p:nvSpPr>
+          <p:cNvPr id="7" name="CasellaDiTesto 6"/>
+          <p:cNvSpPr txBox="1"/>
+          <p:nvPr/>
+        </p:nvSpPr>
+        <p:spPr>
+          <a:xfrm>
+            <a:off x="500034" y="404664"/>
+            <a:ext cx="8142305" cy="1538883"/>
+          </a:xfrm>
+          <a:prstGeom prst="rect">
+            <a:avLst/>
+          </a:prstGeom>
+          <a:noFill/>
+        </p:spPr>
+        <p:txBody>
+          <a:bodyPr wrap="square" rtlCol="0">
+            <a:spAutoFit/>
+          </a:bodyPr>
+          <a:lstStyle/>
+          <a:p>
+            <a:pPr algn="ctr"/>
+            <a:r>
+              <a:rPr lang="it-IT" sz="4800" b="1" dirty="0" smtClean="0"/>
+              <a:t>Gestione Eventi</a:t>
+            </a:r>
+          </a:p>
+          <a:p>
+            <a:pPr algn="ctr"/>
+            <a:r>
+              <a:rPr lang="it-IT" sz="2800" b="1" dirty="0" smtClean="0">
+                <a:latin typeface="+mj-lt"/>
+              </a:rPr>
+              <a:t>Sicurezza e Usabilità vs Complessità e </a:t>
+            </a:r>
+            <a:r>
+              <a:rPr lang="it-IT" sz="2800" b="1" dirty="0" err="1" smtClean="0">
+                <a:latin typeface="+mj-lt"/>
+              </a:rPr>
+              <a:t>Manutenibilità</a:t>
+            </a:r>
+            <a:endParaRPr lang="it-IT" sz="2800" b="1" dirty="0" smtClean="0">
+              <a:latin typeface="+mj-lt"/>
+            </a:endParaRPr>
+          </a:p>
+          <a:p>
+            <a:pPr algn="ctr"/>
+            <a:endParaRPr lang="it-IT" dirty="0">
+              <a:latin typeface="+mj-lt"/>
+            </a:endParaRPr>
+          </a:p>
+        </p:txBody>
+      </p:sp>
     </p:spTree>
     <p:extLst>
       <p:ext uri="{BB962C8B-B14F-4D97-AF65-F5344CB8AC3E}">
-        <p14:creationId xmlns:p14="http://schemas.microsoft.com/office/powerpoint/2010/main" xmlns="" val="155874689"/>
+        <p14:creationId xmlns="" xmlns:p14="http://schemas.microsoft.com/office/powerpoint/2010/main" val="155874689"/>
       </p:ext>
     </p:extLst>
   </p:cSld>
@@ -29721,7 +30041,7 @@
     <a:masterClrMapping/>
   </p:clrMapOvr>
   <mc:AlternateContent xmlns:mc="http://schemas.openxmlformats.org/markup-compatibility/2006">
-    <mc:Choice xmlns:p14="http://schemas.microsoft.com/office/powerpoint/2010/main" xmlns="" Requires="p14">
+    <mc:Choice xmlns="" xmlns:p14="http://schemas.microsoft.com/office/powerpoint/2010/main" Requires="p14">
       <p:transition spd="slow" p14:dur="2000"/>
     </mc:Choice>
     <mc:Fallback>
@@ -29900,42 +30220,6 @@
       </p:pic>
       <p:sp>
         <p:nvSpPr>
-          <p:cNvPr id="6" name="CasellaDiTesto 5"/>
-          <p:cNvSpPr txBox="1"/>
-          <p:nvPr/>
-        </p:nvSpPr>
-        <p:spPr>
-          <a:xfrm>
-            <a:off x="467544" y="592812"/>
-            <a:ext cx="8142305" cy="1107996"/>
-          </a:xfrm>
-          <a:prstGeom prst="rect">
-            <a:avLst/>
-          </a:prstGeom>
-          <a:noFill/>
-        </p:spPr>
-        <p:txBody>
-          <a:bodyPr wrap="square" rtlCol="0">
-            <a:spAutoFit/>
-          </a:bodyPr>
-          <a:lstStyle/>
-          <a:p>
-            <a:pPr algn="ctr"/>
-            <a:r>
-              <a:rPr lang="it-IT" sz="4800" b="1" dirty="0" smtClean="0"/>
-              <a:t>Gestione Eventi</a:t>
-            </a:r>
-          </a:p>
-          <a:p>
-            <a:pPr algn="ctr"/>
-            <a:endParaRPr lang="it-IT" dirty="0">
-              <a:latin typeface="+mj-lt"/>
-            </a:endParaRPr>
-          </a:p>
-        </p:txBody>
-      </p:sp>
-      <p:sp>
-        <p:nvSpPr>
           <p:cNvPr id="7" name="Rettangolo 6"/>
           <p:cNvSpPr/>
           <p:nvPr/>
@@ -30017,10 +30301,64 @@
           </a:p>
         </p:txBody>
       </p:sp>
+      <p:sp>
+        <p:nvSpPr>
+          <p:cNvPr id="5" name="CasellaDiTesto 4"/>
+          <p:cNvSpPr txBox="1"/>
+          <p:nvPr/>
+        </p:nvSpPr>
+        <p:spPr>
+          <a:xfrm>
+            <a:off x="500034" y="404664"/>
+            <a:ext cx="8142305" cy="1538883"/>
+          </a:xfrm>
+          <a:prstGeom prst="rect">
+            <a:avLst/>
+          </a:prstGeom>
+          <a:noFill/>
+        </p:spPr>
+        <p:txBody>
+          <a:bodyPr wrap="square" rtlCol="0">
+            <a:spAutoFit/>
+          </a:bodyPr>
+          <a:lstStyle/>
+          <a:p>
+            <a:pPr algn="ctr"/>
+            <a:r>
+              <a:rPr lang="it-IT" sz="4800" b="1" dirty="0" smtClean="0"/>
+              <a:t>Gestione Eventi</a:t>
+            </a:r>
+          </a:p>
+          <a:p>
+            <a:pPr algn="ctr"/>
+            <a:r>
+              <a:rPr lang="it-IT" sz="2800" b="1" dirty="0" smtClean="0">
+                <a:latin typeface="+mj-lt"/>
+              </a:rPr>
+              <a:t>Sicurezza e Usabilità vs Complessità e </a:t>
+            </a:r>
+            <a:r>
+              <a:rPr lang="it-IT" sz="2800" b="1" dirty="0" err="1" smtClean="0">
+                <a:latin typeface="+mj-lt"/>
+              </a:rPr>
+              <a:t>Manutenibilità</a:t>
+            </a:r>
+            <a:endParaRPr lang="it-IT" sz="2800" b="1" dirty="0" smtClean="0">
+              <a:latin typeface="+mj-lt"/>
+            </a:endParaRPr>
+          </a:p>
+          <a:p>
+            <a:pPr algn="ctr"/>
+            <a:endParaRPr lang="it-IT" dirty="0">
+              <a:latin typeface="+mj-lt"/>
+            </a:endParaRPr>
+          </a:p>
+        </p:txBody>
+      </p:sp>
     </p:spTree>
     <p:extLst>
       <p:ext uri="{BB962C8B-B14F-4D97-AF65-F5344CB8AC3E}">
-        <p14:creationId xmlns:p14="http://schemas.microsoft.com/office/powerpoint/2010/main" xmlns="" val="155874689"/>
+        <p14:creationId xmlns="" xmlns:p14="http://schemas.microsoft.com/office/powerpoint/2010/main" val="155874689"/>
       </p:ext>
     </p:extLst>
   </p:cSld>
@@ -30028,7 +30366,7 @@
     <a:masterClrMapping/>
   </p:clrMapOvr>
   <mc:AlternateContent xmlns:mc="http://schemas.openxmlformats.org/markup-compatibility/2006">
-    <mc:Choice xmlns:p14="http://schemas.microsoft.com/office/powerpoint/2010/main" xmlns="" Requires="p14">
+    <mc:Choice xmlns="" xmlns:p14="http://schemas.microsoft.com/office/powerpoint/2010/main" Requires="p14">
       <p:transition spd="slow" p14:dur="2000"/>
     </mc:Choice>
     <mc:Fallback>
@@ -30330,7 +30668,7 @@
     </p:spTree>
     <p:extLst>
       <p:ext uri="{BB962C8B-B14F-4D97-AF65-F5344CB8AC3E}">
-        <p14:creationId xmlns="" xmlns:p14="http://schemas.microsoft.com/office/powerpoint/2010/main" val="155874689"/>
+        <p14:creationId xmlns:p14="http://schemas.microsoft.com/office/powerpoint/2010/main" xmlns="" val="155874689"/>
       </p:ext>
     </p:extLst>
   </p:cSld>
@@ -30338,7 +30676,7 @@
     <a:masterClrMapping/>
   </p:clrMapOvr>
   <mc:AlternateContent xmlns:mc="http://schemas.openxmlformats.org/markup-compatibility/2006">
-    <mc:Choice xmlns="" xmlns:p14="http://schemas.microsoft.com/office/powerpoint/2010/main" Requires="p14">
+    <mc:Choice xmlns:p14="http://schemas.microsoft.com/office/powerpoint/2010/main" xmlns="" Requires="p14">
       <p:transition spd="slow" p14:dur="2000"/>
     </mc:Choice>
     <mc:Fallback>
@@ -31163,7 +31501,7 @@
     </p:spTree>
     <p:extLst>
       <p:ext uri="{BB962C8B-B14F-4D97-AF65-F5344CB8AC3E}">
-        <p14:creationId xmlns:p14="http://schemas.microsoft.com/office/powerpoint/2010/main" xmlns="" val="155874689"/>
+        <p14:creationId xmlns="" xmlns:p14="http://schemas.microsoft.com/office/powerpoint/2010/main" val="155874689"/>
       </p:ext>
     </p:extLst>
   </p:cSld>
@@ -33111,7 +33449,7 @@
           <a:blip r:embed="rId3" cstate="print">
             <a:extLst>
               <a:ext uri="{28A0092B-C50C-407E-A947-70E740481C1C}">
-                <a14:useLocalDpi xmlns:a14="http://schemas.microsoft.com/office/drawing/2010/main" xmlns="" val="0"/>
+                <a14:useLocalDpi xmlns="" xmlns:a14="http://schemas.microsoft.com/office/drawing/2010/main" val="0"/>
               </a:ext>
             </a:extLst>
           </a:blip>
@@ -33131,7 +33469,7 @@
           <a:noFill/>
           <a:extLst>
             <a:ext uri="{909E8E84-426E-40DD-AFC4-6F175D3DCCD1}">
-              <a14:hiddenFill xmlns:a14="http://schemas.microsoft.com/office/drawing/2010/main" xmlns="">
+              <a14:hiddenFill xmlns="" xmlns:a14="http://schemas.microsoft.com/office/drawing/2010/main">
                 <a:solidFill>
                   <a:srgbClr val="FFFFFF"/>
                 </a:solidFill>
@@ -33450,7 +33788,7 @@
     </p:spTree>
     <p:extLst>
       <p:ext uri="{BB962C8B-B14F-4D97-AF65-F5344CB8AC3E}">
-        <p14:creationId xmlns:p14="http://schemas.microsoft.com/office/powerpoint/2010/main" xmlns="" val="3983998448"/>
+        <p14:creationId xmlns="" xmlns:p14="http://schemas.microsoft.com/office/powerpoint/2010/main" val="3983998448"/>
       </p:ext>
     </p:extLst>
   </p:cSld>
@@ -36349,7 +36687,7 @@
           <a:blip r:embed="rId3" cstate="print">
             <a:extLst>
               <a:ext uri="{28A0092B-C50C-407E-A947-70E740481C1C}">
-                <a14:useLocalDpi xmlns:a14="http://schemas.microsoft.com/office/drawing/2010/main" xmlns="" val="0"/>
+                <a14:useLocalDpi xmlns="" xmlns:a14="http://schemas.microsoft.com/office/drawing/2010/main" val="0"/>
               </a:ext>
             </a:extLst>
           </a:blip>
@@ -36369,7 +36707,7 @@
           <a:noFill/>
           <a:extLst>
             <a:ext uri="{909E8E84-426E-40DD-AFC4-6F175D3DCCD1}">
-              <a14:hiddenFill xmlns:a14="http://schemas.microsoft.com/office/drawing/2010/main" xmlns="">
+              <a14:hiddenFill xmlns="" xmlns:a14="http://schemas.microsoft.com/office/drawing/2010/main">
                 <a:solidFill>
                   <a:srgbClr val="FFFFFF"/>
                 </a:solidFill>
@@ -36629,7 +36967,7 @@
           <a:blip r:embed="rId2" cstate="print">
             <a:extLst>
               <a:ext uri="{28A0092B-C50C-407E-A947-70E740481C1C}">
-                <a14:useLocalDpi xmlns:a14="http://schemas.microsoft.com/office/drawing/2010/main" xmlns="" val="0"/>
+                <a14:useLocalDpi xmlns="" xmlns:a14="http://schemas.microsoft.com/office/drawing/2010/main" val="0"/>
               </a:ext>
             </a:extLst>
           </a:blip>
@@ -36649,7 +36987,7 @@
           <a:noFill/>
           <a:extLst>
             <a:ext uri="{909E8E84-426E-40DD-AFC4-6F175D3DCCD1}">
-              <a14:hiddenFill xmlns:a14="http://schemas.microsoft.com/office/drawing/2010/main" xmlns="">
+              <a14:hiddenFill xmlns="" xmlns:a14="http://schemas.microsoft.com/office/drawing/2010/main">
                 <a:solidFill>
                   <a:srgbClr val="FFFFFF"/>
                 </a:solidFill>
@@ -36744,7 +37082,7 @@
     </p:spTree>
     <p:extLst>
       <p:ext uri="{BB962C8B-B14F-4D97-AF65-F5344CB8AC3E}">
-        <p14:creationId xmlns:p14="http://schemas.microsoft.com/office/powerpoint/2010/main" xmlns="" val="3516333073"/>
+        <p14:creationId xmlns="" xmlns:p14="http://schemas.microsoft.com/office/powerpoint/2010/main" val="3516333073"/>
       </p:ext>
     </p:extLst>
   </p:cSld>
@@ -36752,7 +37090,7 @@
     <a:masterClrMapping/>
   </p:clrMapOvr>
   <mc:AlternateContent xmlns:mc="http://schemas.openxmlformats.org/markup-compatibility/2006">
-    <mc:Choice xmlns:p14="http://schemas.microsoft.com/office/powerpoint/2010/main" xmlns="" Requires="p14">
+    <mc:Choice xmlns="" xmlns:p14="http://schemas.microsoft.com/office/powerpoint/2010/main" Requires="p14">
       <p:transition spd="slow" p14:dur="2000"/>
     </mc:Choice>
     <mc:Fallback>
@@ -36911,7 +37249,7 @@
           <a:blip r:embed="rId2" cstate="print">
             <a:extLst>
               <a:ext uri="{28A0092B-C50C-407E-A947-70E740481C1C}">
-                <a14:useLocalDpi xmlns:a14="http://schemas.microsoft.com/office/drawing/2010/main" xmlns="" val="0"/>
+                <a14:useLocalDpi xmlns="" xmlns:a14="http://schemas.microsoft.com/office/drawing/2010/main" val="0"/>
               </a:ext>
             </a:extLst>
           </a:blip>
@@ -36931,7 +37269,7 @@
           <a:noFill/>
           <a:extLst>
             <a:ext uri="{909E8E84-426E-40DD-AFC4-6F175D3DCCD1}">
-              <a14:hiddenFill xmlns:a14="http://schemas.microsoft.com/office/drawing/2010/main" xmlns="">
+              <a14:hiddenFill xmlns="" xmlns:a14="http://schemas.microsoft.com/office/drawing/2010/main">
                 <a:solidFill>
                   <a:srgbClr val="FFFFFF"/>
                 </a:solidFill>
@@ -37006,7 +37344,7 @@
     </p:spTree>
     <p:extLst>
       <p:ext uri="{BB962C8B-B14F-4D97-AF65-F5344CB8AC3E}">
-        <p14:creationId xmlns:p14="http://schemas.microsoft.com/office/powerpoint/2010/main" xmlns="" val="576094641"/>
+        <p14:creationId xmlns="" xmlns:p14="http://schemas.microsoft.com/office/powerpoint/2010/main" val="576094641"/>
       </p:ext>
     </p:extLst>
   </p:cSld>
@@ -37014,7 +37352,7 @@
     <a:masterClrMapping/>
   </p:clrMapOvr>
   <mc:AlternateContent xmlns:mc="http://schemas.openxmlformats.org/markup-compatibility/2006">
-    <mc:Choice xmlns:p14="http://schemas.microsoft.com/office/powerpoint/2010/main" xmlns="" Requires="p14">
+    <mc:Choice xmlns="" xmlns:p14="http://schemas.microsoft.com/office/powerpoint/2010/main" Requires="p14">
       <p:transition spd="slow" p14:dur="2000"/>
     </mc:Choice>
     <mc:Fallback>

</xml_diff>